<commit_message>
Update pp mon Mobile
</commit_message>
<xml_diff>
--- a/Mobile_DocAndPP/4PPowwerpoint.pptx
+++ b/Mobile_DocAndPP/4PPowwerpoint.pptx
@@ -243,7 +243,7 @@
           <p:cNvPr id="2" name="그림 개체 틀 2">
             <a:extLst>
               <a:ext uri="{FF2B5EF4-FFF2-40B4-BE49-F238E27FC236}">
-                <a16:creationId xmlns:a16="http://schemas.microsoft.com/office/drawing/2014/main" id="{6B69EC6E-2DBC-4CA7-860F-ECFAA8EF01F7}"/>
+                <a16:creationId xmlns:a16="http://schemas.microsoft.com/office/drawing/2014/main" xmlns="" id="{6B69EC6E-2DBC-4CA7-860F-ECFAA8EF01F7}"/>
               </a:ext>
             </a:extLst>
           </p:cNvPr>
@@ -371,7 +371,7 @@
           <p:cNvPr id="2" name="그림 개체 틀 2">
             <a:extLst>
               <a:ext uri="{FF2B5EF4-FFF2-40B4-BE49-F238E27FC236}">
-                <a16:creationId xmlns:a16="http://schemas.microsoft.com/office/drawing/2014/main" id="{CEF41FC5-18C8-46B4-9DAF-A0B5333EA27A}"/>
+                <a16:creationId xmlns:a16="http://schemas.microsoft.com/office/drawing/2014/main" xmlns="" id="{CEF41FC5-18C8-46B4-9DAF-A0B5333EA27A}"/>
               </a:ext>
             </a:extLst>
           </p:cNvPr>
@@ -425,7 +425,7 @@
           <p:cNvPr id="3" name="Rectangle 2">
             <a:extLst>
               <a:ext uri="{FF2B5EF4-FFF2-40B4-BE49-F238E27FC236}">
-                <a16:creationId xmlns:a16="http://schemas.microsoft.com/office/drawing/2014/main" id="{DE073C10-8640-4F3C-B2E4-C837BE5509C5}"/>
+                <a16:creationId xmlns:a16="http://schemas.microsoft.com/office/drawing/2014/main" xmlns="" id="{DE073C10-8640-4F3C-B2E4-C837BE5509C5}"/>
               </a:ext>
             </a:extLst>
           </p:cNvPr>
@@ -518,7 +518,7 @@
           <p:cNvPr id="2" name="Picture Placeholder 6">
             <a:extLst>
               <a:ext uri="{FF2B5EF4-FFF2-40B4-BE49-F238E27FC236}">
-                <a16:creationId xmlns:a16="http://schemas.microsoft.com/office/drawing/2014/main" id="{006D4B37-3DBA-4BD8-912F-A843033ADF9F}"/>
+                <a16:creationId xmlns:a16="http://schemas.microsoft.com/office/drawing/2014/main" xmlns="" id="{006D4B37-3DBA-4BD8-912F-A843033ADF9F}"/>
               </a:ext>
             </a:extLst>
           </p:cNvPr>
@@ -658,7 +658,7 @@
           <p:cNvPr id="3" name="Picture Placeholder 7">
             <a:extLst>
               <a:ext uri="{FF2B5EF4-FFF2-40B4-BE49-F238E27FC236}">
-                <a16:creationId xmlns:a16="http://schemas.microsoft.com/office/drawing/2014/main" id="{6DCBC7DC-32B7-4775-8C88-50655FC58FB5}"/>
+                <a16:creationId xmlns:a16="http://schemas.microsoft.com/office/drawing/2014/main" xmlns="" id="{6DCBC7DC-32B7-4775-8C88-50655FC58FB5}"/>
               </a:ext>
             </a:extLst>
           </p:cNvPr>
@@ -801,7 +801,7 @@
           <p:cNvPr id="4" name="Picture Placeholder 8">
             <a:extLst>
               <a:ext uri="{FF2B5EF4-FFF2-40B4-BE49-F238E27FC236}">
-                <a16:creationId xmlns:a16="http://schemas.microsoft.com/office/drawing/2014/main" id="{C594825B-001C-4F46-9DFF-BD6B030D0E0F}"/>
+                <a16:creationId xmlns:a16="http://schemas.microsoft.com/office/drawing/2014/main" xmlns="" id="{C594825B-001C-4F46-9DFF-BD6B030D0E0F}"/>
               </a:ext>
             </a:extLst>
           </p:cNvPr>
@@ -971,7 +971,7 @@
           <p:cNvPr id="2" name="Rectangle 1">
             <a:extLst>
               <a:ext uri="{FF2B5EF4-FFF2-40B4-BE49-F238E27FC236}">
-                <a16:creationId xmlns:a16="http://schemas.microsoft.com/office/drawing/2014/main" id="{71709633-A92F-4ED9-99D1-042A99AAC6A5}"/>
+                <a16:creationId xmlns:a16="http://schemas.microsoft.com/office/drawing/2014/main" xmlns="" id="{71709633-A92F-4ED9-99D1-042A99AAC6A5}"/>
               </a:ext>
             </a:extLst>
           </p:cNvPr>
@@ -1023,7 +1023,7 @@
           <p:cNvPr id="5" name="Picture Placeholder 4">
             <a:extLst>
               <a:ext uri="{FF2B5EF4-FFF2-40B4-BE49-F238E27FC236}">
-                <a16:creationId xmlns:a16="http://schemas.microsoft.com/office/drawing/2014/main" id="{A40CBBFA-C5B7-4809-BA42-28256F92DD9B}"/>
+                <a16:creationId xmlns:a16="http://schemas.microsoft.com/office/drawing/2014/main" xmlns="" id="{A40CBBFA-C5B7-4809-BA42-28256F92DD9B}"/>
               </a:ext>
             </a:extLst>
           </p:cNvPr>
@@ -1640,7 +1640,7 @@
           <p:cNvPr id="2" name="Group 1">
             <a:extLst>
               <a:ext uri="{FF2B5EF4-FFF2-40B4-BE49-F238E27FC236}">
-                <a16:creationId xmlns:a16="http://schemas.microsoft.com/office/drawing/2014/main" id="{7DFFED1C-7347-44FB-B415-96ADEBB15B5A}"/>
+                <a16:creationId xmlns:a16="http://schemas.microsoft.com/office/drawing/2014/main" xmlns="" id="{7DFFED1C-7347-44FB-B415-96ADEBB15B5A}"/>
               </a:ext>
             </a:extLst>
           </p:cNvPr>
@@ -1660,7 +1660,7 @@
             <p:cNvPr id="3" name="Rectangle 2">
               <a:extLst>
                 <a:ext uri="{FF2B5EF4-FFF2-40B4-BE49-F238E27FC236}">
-                  <a16:creationId xmlns:a16="http://schemas.microsoft.com/office/drawing/2014/main" id="{C0B78BFC-95A5-416C-AE31-98A37ED27526}"/>
+                  <a16:creationId xmlns:a16="http://schemas.microsoft.com/office/drawing/2014/main" xmlns="" id="{C0B78BFC-95A5-416C-AE31-98A37ED27526}"/>
                 </a:ext>
               </a:extLst>
             </p:cNvPr>
@@ -1712,7 +1712,7 @@
             <p:cNvPr id="4" name="Rectangle 3">
               <a:extLst>
                 <a:ext uri="{FF2B5EF4-FFF2-40B4-BE49-F238E27FC236}">
-                  <a16:creationId xmlns:a16="http://schemas.microsoft.com/office/drawing/2014/main" id="{1225F02D-D8DA-4283-B0B2-0CB36F3B38BE}"/>
+                  <a16:creationId xmlns:a16="http://schemas.microsoft.com/office/drawing/2014/main" xmlns="" id="{1225F02D-D8DA-4283-B0B2-0CB36F3B38BE}"/>
                 </a:ext>
               </a:extLst>
             </p:cNvPr>
@@ -1765,7 +1765,7 @@
           <p:cNvPr id="5" name="Text Placeholder 9">
             <a:extLst>
               <a:ext uri="{FF2B5EF4-FFF2-40B4-BE49-F238E27FC236}">
-                <a16:creationId xmlns:a16="http://schemas.microsoft.com/office/drawing/2014/main" id="{77809EEB-5FBD-405D-9DAF-33CFDC0B33E5}"/>
+                <a16:creationId xmlns:a16="http://schemas.microsoft.com/office/drawing/2014/main" xmlns="" id="{77809EEB-5FBD-405D-9DAF-33CFDC0B33E5}"/>
               </a:ext>
             </a:extLst>
           </p:cNvPr>
@@ -1816,7 +1816,7 @@
           <p:cNvPr id="6" name="Group 5">
             <a:extLst>
               <a:ext uri="{FF2B5EF4-FFF2-40B4-BE49-F238E27FC236}">
-                <a16:creationId xmlns:a16="http://schemas.microsoft.com/office/drawing/2014/main" id="{45A844D3-5676-40C9-8B70-99FCB08E080B}"/>
+                <a16:creationId xmlns:a16="http://schemas.microsoft.com/office/drawing/2014/main" xmlns="" id="{45A844D3-5676-40C9-8B70-99FCB08E080B}"/>
               </a:ext>
             </a:extLst>
           </p:cNvPr>
@@ -1836,7 +1836,7 @@
             <p:cNvPr id="7" name="Group 3">
               <a:extLst>
                 <a:ext uri="{FF2B5EF4-FFF2-40B4-BE49-F238E27FC236}">
-                  <a16:creationId xmlns:a16="http://schemas.microsoft.com/office/drawing/2014/main" id="{FE5FA093-4730-40D3-9808-FCB8F2754301}"/>
+                  <a16:creationId xmlns:a16="http://schemas.microsoft.com/office/drawing/2014/main" xmlns="" id="{FE5FA093-4730-40D3-9808-FCB8F2754301}"/>
                 </a:ext>
               </a:extLst>
             </p:cNvPr>
@@ -1856,7 +1856,7 @@
               <p:cNvPr id="9" name="Rounded Rectangle 4">
                 <a:extLst>
                   <a:ext uri="{FF2B5EF4-FFF2-40B4-BE49-F238E27FC236}">
-                    <a16:creationId xmlns:a16="http://schemas.microsoft.com/office/drawing/2014/main" id="{3F26B978-F2BA-4435-BD7D-8BA75383445C}"/>
+                    <a16:creationId xmlns:a16="http://schemas.microsoft.com/office/drawing/2014/main" xmlns="" id="{3F26B978-F2BA-4435-BD7D-8BA75383445C}"/>
                   </a:ext>
                 </a:extLst>
               </p:cNvPr>
@@ -1919,7 +1919,7 @@
               <p:cNvPr id="10" name="Rectangle 5">
                 <a:extLst>
                   <a:ext uri="{FF2B5EF4-FFF2-40B4-BE49-F238E27FC236}">
-                    <a16:creationId xmlns:a16="http://schemas.microsoft.com/office/drawing/2014/main" id="{A9EE186C-4FA2-483F-9560-BC0FB4295DB0}"/>
+                    <a16:creationId xmlns:a16="http://schemas.microsoft.com/office/drawing/2014/main" xmlns="" id="{A9EE186C-4FA2-483F-9560-BC0FB4295DB0}"/>
                   </a:ext>
                 </a:extLst>
               </p:cNvPr>
@@ -1971,7 +1971,7 @@
               <p:cNvPr id="11" name="Group 6">
                 <a:extLst>
                   <a:ext uri="{FF2B5EF4-FFF2-40B4-BE49-F238E27FC236}">
-                    <a16:creationId xmlns:a16="http://schemas.microsoft.com/office/drawing/2014/main" id="{AAB42CB8-FB70-4384-9995-4093F4013C6D}"/>
+                    <a16:creationId xmlns:a16="http://schemas.microsoft.com/office/drawing/2014/main" xmlns="" id="{AAB42CB8-FB70-4384-9995-4093F4013C6D}"/>
                   </a:ext>
                 </a:extLst>
               </p:cNvPr>
@@ -1991,7 +1991,7 @@
                 <p:cNvPr id="12" name="Oval 7">
                   <a:extLst>
                     <a:ext uri="{FF2B5EF4-FFF2-40B4-BE49-F238E27FC236}">
-                      <a16:creationId xmlns:a16="http://schemas.microsoft.com/office/drawing/2014/main" id="{744D317D-5CFC-48E4-9BF4-98C3EF35219A}"/>
+                      <a16:creationId xmlns:a16="http://schemas.microsoft.com/office/drawing/2014/main" xmlns="" id="{744D317D-5CFC-48E4-9BF4-98C3EF35219A}"/>
                     </a:ext>
                   </a:extLst>
                 </p:cNvPr>
@@ -2078,7 +2078,7 @@
                 <p:cNvPr id="13" name="Rounded Rectangle 8">
                   <a:extLst>
                     <a:ext uri="{FF2B5EF4-FFF2-40B4-BE49-F238E27FC236}">
-                      <a16:creationId xmlns:a16="http://schemas.microsoft.com/office/drawing/2014/main" id="{2D06F3B8-61E2-4783-87B7-3B516CEFD8FC}"/>
+                      <a16:creationId xmlns:a16="http://schemas.microsoft.com/office/drawing/2014/main" xmlns="" id="{2D06F3B8-61E2-4783-87B7-3B516CEFD8FC}"/>
                     </a:ext>
                   </a:extLst>
                 </p:cNvPr>
@@ -2134,7 +2134,7 @@
             <p:cNvPr id="8" name="Picture Placeholder 2">
               <a:extLst>
                 <a:ext uri="{FF2B5EF4-FFF2-40B4-BE49-F238E27FC236}">
-                  <a16:creationId xmlns:a16="http://schemas.microsoft.com/office/drawing/2014/main" id="{96F46C5E-6300-4590-BCDF-772B5093F309}"/>
+                  <a16:creationId xmlns:a16="http://schemas.microsoft.com/office/drawing/2014/main" xmlns="" id="{96F46C5E-6300-4590-BCDF-772B5093F309}"/>
                 </a:ext>
               </a:extLst>
             </p:cNvPr>
@@ -2341,7 +2341,7 @@
           <p:cNvPr id="14" name="그림 개체 틀 2">
             <a:extLst>
               <a:ext uri="{FF2B5EF4-FFF2-40B4-BE49-F238E27FC236}">
-                <a16:creationId xmlns:a16="http://schemas.microsoft.com/office/drawing/2014/main" id="{C047C560-DD35-4A91-83AA-295EE299363D}"/>
+                <a16:creationId xmlns:a16="http://schemas.microsoft.com/office/drawing/2014/main" xmlns="" id="{C047C560-DD35-4A91-83AA-295EE299363D}"/>
               </a:ext>
             </a:extLst>
           </p:cNvPr>
@@ -2851,7 +2851,7 @@
           <p:cNvPr id="58" name="TextBox 57">
             <a:extLst>
               <a:ext uri="{FF2B5EF4-FFF2-40B4-BE49-F238E27FC236}">
-                <a16:creationId xmlns:a16="http://schemas.microsoft.com/office/drawing/2014/main" id="{5644E8BB-F13A-4AE0-889E-633DE4143787}"/>
+                <a16:creationId xmlns:a16="http://schemas.microsoft.com/office/drawing/2014/main" xmlns="" id="{5644E8BB-F13A-4AE0-889E-633DE4143787}"/>
               </a:ext>
             </a:extLst>
           </p:cNvPr>
@@ -2899,7 +2899,7 @@
           <p:cNvPr id="59" name="TextBox 58">
             <a:extLst>
               <a:ext uri="{FF2B5EF4-FFF2-40B4-BE49-F238E27FC236}">
-                <a16:creationId xmlns:a16="http://schemas.microsoft.com/office/drawing/2014/main" id="{F2CE2B8B-ED32-491A-95B2-D28904BC432C}"/>
+                <a16:creationId xmlns:a16="http://schemas.microsoft.com/office/drawing/2014/main" xmlns="" id="{F2CE2B8B-ED32-491A-95B2-D28904BC432C}"/>
               </a:ext>
             </a:extLst>
           </p:cNvPr>
@@ -2959,7 +2959,7 @@
           <p:cNvPr id="60" name="TextBox 59">
             <a:extLst>
               <a:ext uri="{FF2B5EF4-FFF2-40B4-BE49-F238E27FC236}">
-                <a16:creationId xmlns:a16="http://schemas.microsoft.com/office/drawing/2014/main" id="{962A52DF-2523-4479-BFA3-B5ACE9887E1C}"/>
+                <a16:creationId xmlns:a16="http://schemas.microsoft.com/office/drawing/2014/main" xmlns="" id="{962A52DF-2523-4479-BFA3-B5ACE9887E1C}"/>
               </a:ext>
             </a:extLst>
           </p:cNvPr>
@@ -3007,7 +3007,7 @@
           <p:cNvPr id="61" name="TextBox 60">
             <a:extLst>
               <a:ext uri="{FF2B5EF4-FFF2-40B4-BE49-F238E27FC236}">
-                <a16:creationId xmlns:a16="http://schemas.microsoft.com/office/drawing/2014/main" id="{BAAC314F-E96A-4408-95DE-A70E9ED054AF}"/>
+                <a16:creationId xmlns:a16="http://schemas.microsoft.com/office/drawing/2014/main" xmlns="" id="{BAAC314F-E96A-4408-95DE-A70E9ED054AF}"/>
               </a:ext>
             </a:extLst>
           </p:cNvPr>
@@ -3136,7 +3136,7 @@
           <p:cNvPr id="2" name="Text Placeholder 9">
             <a:extLst>
               <a:ext uri="{FF2B5EF4-FFF2-40B4-BE49-F238E27FC236}">
-                <a16:creationId xmlns:a16="http://schemas.microsoft.com/office/drawing/2014/main" id="{23DE32A5-6181-4C51-AD5C-3F1A448478A1}"/>
+                <a16:creationId xmlns:a16="http://schemas.microsoft.com/office/drawing/2014/main" xmlns="" id="{23DE32A5-6181-4C51-AD5C-3F1A448478A1}"/>
               </a:ext>
             </a:extLst>
           </p:cNvPr>
@@ -3291,7 +3291,7 @@
           <p:cNvPr id="3" name="Text Placeholder 9">
             <a:extLst>
               <a:ext uri="{FF2B5EF4-FFF2-40B4-BE49-F238E27FC236}">
-                <a16:creationId xmlns:a16="http://schemas.microsoft.com/office/drawing/2014/main" id="{EF70765A-4598-4D75-8EBE-B820808F6559}"/>
+                <a16:creationId xmlns:a16="http://schemas.microsoft.com/office/drawing/2014/main" xmlns="" id="{EF70765A-4598-4D75-8EBE-B820808F6559}"/>
               </a:ext>
             </a:extLst>
           </p:cNvPr>
@@ -3342,7 +3342,7 @@
           <p:cNvPr id="4" name="Rectangle 3">
             <a:extLst>
               <a:ext uri="{FF2B5EF4-FFF2-40B4-BE49-F238E27FC236}">
-                <a16:creationId xmlns:a16="http://schemas.microsoft.com/office/drawing/2014/main" id="{F381E83D-1615-4CCC-B7E2-465DE0061B9F}"/>
+                <a16:creationId xmlns:a16="http://schemas.microsoft.com/office/drawing/2014/main" xmlns="" id="{F381E83D-1615-4CCC-B7E2-465DE0061B9F}"/>
               </a:ext>
             </a:extLst>
           </p:cNvPr>
@@ -3394,7 +3394,7 @@
           <p:cNvPr id="5" name="그림 개체 틀 2">
             <a:extLst>
               <a:ext uri="{FF2B5EF4-FFF2-40B4-BE49-F238E27FC236}">
-                <a16:creationId xmlns:a16="http://schemas.microsoft.com/office/drawing/2014/main" id="{3CD33C19-9966-4061-9C06-8562E26E5C9D}"/>
+                <a16:creationId xmlns:a16="http://schemas.microsoft.com/office/drawing/2014/main" xmlns="" id="{3CD33C19-9966-4061-9C06-8562E26E5C9D}"/>
               </a:ext>
             </a:extLst>
           </p:cNvPr>
@@ -3478,7 +3478,7 @@
           <p:cNvPr id="5" name="Rectangle: Top Corners Rounded 4">
             <a:extLst>
               <a:ext uri="{FF2B5EF4-FFF2-40B4-BE49-F238E27FC236}">
-                <a16:creationId xmlns:a16="http://schemas.microsoft.com/office/drawing/2014/main" id="{193C3917-5565-466A-887F-9A51D013E131}"/>
+                <a16:creationId xmlns:a16="http://schemas.microsoft.com/office/drawing/2014/main" xmlns="" id="{193C3917-5565-466A-887F-9A51D013E131}"/>
               </a:ext>
             </a:extLst>
           </p:cNvPr>
@@ -3535,7 +3535,7 @@
           <p:cNvPr id="6" name="Rectangle: Top Corners Rounded 5">
             <a:extLst>
               <a:ext uri="{FF2B5EF4-FFF2-40B4-BE49-F238E27FC236}">
-                <a16:creationId xmlns:a16="http://schemas.microsoft.com/office/drawing/2014/main" id="{AA5DBC2F-2573-4478-81A6-229D479F1BA5}"/>
+                <a16:creationId xmlns:a16="http://schemas.microsoft.com/office/drawing/2014/main" xmlns="" id="{AA5DBC2F-2573-4478-81A6-229D479F1BA5}"/>
               </a:ext>
             </a:extLst>
           </p:cNvPr>
@@ -3590,7 +3590,7 @@
           <p:cNvPr id="3" name="Rectangle: Top Corners Rounded 2">
             <a:extLst>
               <a:ext uri="{FF2B5EF4-FFF2-40B4-BE49-F238E27FC236}">
-                <a16:creationId xmlns:a16="http://schemas.microsoft.com/office/drawing/2014/main" id="{BEEA2D1A-FA3E-4C74-A09D-E1A106AB24E6}"/>
+                <a16:creationId xmlns:a16="http://schemas.microsoft.com/office/drawing/2014/main" xmlns="" id="{BEEA2D1A-FA3E-4C74-A09D-E1A106AB24E6}"/>
               </a:ext>
             </a:extLst>
           </p:cNvPr>
@@ -3645,7 +3645,7 @@
           <p:cNvPr id="4" name="그림 개체 틀 2">
             <a:extLst>
               <a:ext uri="{FF2B5EF4-FFF2-40B4-BE49-F238E27FC236}">
-                <a16:creationId xmlns:a16="http://schemas.microsoft.com/office/drawing/2014/main" id="{E5F47ABD-950C-435F-867F-66F849BD95CE}"/>
+                <a16:creationId xmlns:a16="http://schemas.microsoft.com/office/drawing/2014/main" xmlns="" id="{E5F47ABD-950C-435F-867F-66F849BD95CE}"/>
               </a:ext>
             </a:extLst>
           </p:cNvPr>
@@ -3773,7 +3773,7 @@
           <p:cNvPr id="2" name="Picture Placeholder 7">
             <a:extLst>
               <a:ext uri="{FF2B5EF4-FFF2-40B4-BE49-F238E27FC236}">
-                <a16:creationId xmlns:a16="http://schemas.microsoft.com/office/drawing/2014/main" id="{BAF8F5C0-FE3B-4322-834B-ADAF91515451}"/>
+                <a16:creationId xmlns:a16="http://schemas.microsoft.com/office/drawing/2014/main" xmlns="" id="{BAF8F5C0-FE3B-4322-834B-ADAF91515451}"/>
               </a:ext>
             </a:extLst>
           </p:cNvPr>
@@ -3916,7 +3916,7 @@
           <p:cNvPr id="4" name="Picture Placeholder 7">
             <a:extLst>
               <a:ext uri="{FF2B5EF4-FFF2-40B4-BE49-F238E27FC236}">
-                <a16:creationId xmlns:a16="http://schemas.microsoft.com/office/drawing/2014/main" id="{16B664DE-605A-4D0E-B2C7-0612FB124184}"/>
+                <a16:creationId xmlns:a16="http://schemas.microsoft.com/office/drawing/2014/main" xmlns="" id="{16B664DE-605A-4D0E-B2C7-0612FB124184}"/>
               </a:ext>
             </a:extLst>
           </p:cNvPr>
@@ -4056,7 +4056,7 @@
           <p:cNvPr id="3" name="Picture Placeholder 7">
             <a:extLst>
               <a:ext uri="{FF2B5EF4-FFF2-40B4-BE49-F238E27FC236}">
-                <a16:creationId xmlns:a16="http://schemas.microsoft.com/office/drawing/2014/main" id="{02A65B3A-02FE-4279-B8F1-0E86FB60BA42}"/>
+                <a16:creationId xmlns:a16="http://schemas.microsoft.com/office/drawing/2014/main" xmlns="" id="{02A65B3A-02FE-4279-B8F1-0E86FB60BA42}"/>
               </a:ext>
             </a:extLst>
           </p:cNvPr>
@@ -4196,7 +4196,7 @@
           <p:cNvPr id="5" name="Picture Placeholder 7">
             <a:extLst>
               <a:ext uri="{FF2B5EF4-FFF2-40B4-BE49-F238E27FC236}">
-                <a16:creationId xmlns:a16="http://schemas.microsoft.com/office/drawing/2014/main" id="{C8044A80-8C78-4E5F-9DD6-8F16BD1AC648}"/>
+                <a16:creationId xmlns:a16="http://schemas.microsoft.com/office/drawing/2014/main" xmlns="" id="{C8044A80-8C78-4E5F-9DD6-8F16BD1AC648}"/>
               </a:ext>
             </a:extLst>
           </p:cNvPr>
@@ -5334,7 +5334,7 @@
             <a:hlinkClick r:id="rId2"/>
             <a:extLst>
               <a:ext uri="{FF2B5EF4-FFF2-40B4-BE49-F238E27FC236}">
-                <a16:creationId xmlns:a16="http://schemas.microsoft.com/office/drawing/2014/main" id="{65EB7FFB-6FB1-480A-A898-65150C03087A}"/>
+                <a16:creationId xmlns:a16="http://schemas.microsoft.com/office/drawing/2014/main" xmlns="" id="{65EB7FFB-6FB1-480A-A898-65150C03087A}"/>
               </a:ext>
             </a:extLst>
           </p:cNvPr>
@@ -5364,7 +5364,7 @@
                 <a:hlinkClick r:id="rId2">
                   <a:extLst>
                     <a:ext uri="{A12FA001-AC4F-418D-AE19-62706E023703}">
-                      <ahyp:hlinkClr xmlns:ahyp="http://schemas.microsoft.com/office/drawing/2018/hyperlinkcolor" val="tx"/>
+                      <ahyp:hlinkClr xmlns:ahyp="http://schemas.microsoft.com/office/drawing/2018/hyperlinkcolor" xmlns="" val="tx"/>
                     </a:ext>
                   </a:extLst>
                 </a:hlinkClick>
@@ -5382,7 +5382,7 @@
           <p:cNvPr id="8" name="TextBox 7">
             <a:extLst>
               <a:ext uri="{FF2B5EF4-FFF2-40B4-BE49-F238E27FC236}">
-                <a16:creationId xmlns:a16="http://schemas.microsoft.com/office/drawing/2014/main" id="{03B4C724-0776-4328-8F0A-B72DA1579537}"/>
+                <a16:creationId xmlns:a16="http://schemas.microsoft.com/office/drawing/2014/main" xmlns="" id="{03B4C724-0776-4328-8F0A-B72DA1579537}"/>
               </a:ext>
             </a:extLst>
           </p:cNvPr>
@@ -5426,7 +5426,7 @@
           <p:cNvPr id="9" name="TextBox 8">
             <a:extLst>
               <a:ext uri="{FF2B5EF4-FFF2-40B4-BE49-F238E27FC236}">
-                <a16:creationId xmlns:a16="http://schemas.microsoft.com/office/drawing/2014/main" id="{2B6167FF-AD5E-41E4-8385-3024DC936CF2}"/>
+                <a16:creationId xmlns:a16="http://schemas.microsoft.com/office/drawing/2014/main" xmlns="" id="{2B6167FF-AD5E-41E4-8385-3024DC936CF2}"/>
               </a:ext>
             </a:extLst>
           </p:cNvPr>
@@ -5479,7 +5479,7 @@
           <p:cNvPr id="10" name="Freeform: Shape 9">
             <a:extLst>
               <a:ext uri="{FF2B5EF4-FFF2-40B4-BE49-F238E27FC236}">
-                <a16:creationId xmlns:a16="http://schemas.microsoft.com/office/drawing/2014/main" id="{698CCF85-D41C-4EAE-823B-E51B2EB28E9D}"/>
+                <a16:creationId xmlns:a16="http://schemas.microsoft.com/office/drawing/2014/main" xmlns="" id="{698CCF85-D41C-4EAE-823B-E51B2EB28E9D}"/>
               </a:ext>
             </a:extLst>
           </p:cNvPr>
@@ -6806,7 +6806,7 @@
           <p:cNvPr id="17" name="Oval 16">
             <a:extLst>
               <a:ext uri="{FF2B5EF4-FFF2-40B4-BE49-F238E27FC236}">
-                <a16:creationId xmlns:a16="http://schemas.microsoft.com/office/drawing/2014/main" id="{15F4D9C9-CBF5-4570-9F65-F13FCD2DDCD7}"/>
+                <a16:creationId xmlns:a16="http://schemas.microsoft.com/office/drawing/2014/main" xmlns="" id="{15F4D9C9-CBF5-4570-9F65-F13FCD2DDCD7}"/>
               </a:ext>
             </a:extLst>
           </p:cNvPr>
@@ -6858,7 +6858,7 @@
           <p:cNvPr id="24" name="Oval 23">
             <a:extLst>
               <a:ext uri="{FF2B5EF4-FFF2-40B4-BE49-F238E27FC236}">
-                <a16:creationId xmlns:a16="http://schemas.microsoft.com/office/drawing/2014/main" id="{750F7546-A866-454E-90FD-98F125C3FEBA}"/>
+                <a16:creationId xmlns:a16="http://schemas.microsoft.com/office/drawing/2014/main" xmlns="" id="{750F7546-A866-454E-90FD-98F125C3FEBA}"/>
               </a:ext>
             </a:extLst>
           </p:cNvPr>
@@ -6914,7 +6914,7 @@
           <p:cNvPr id="5" name="Group 4">
             <a:extLst>
               <a:ext uri="{FF2B5EF4-FFF2-40B4-BE49-F238E27FC236}">
-                <a16:creationId xmlns:a16="http://schemas.microsoft.com/office/drawing/2014/main" id="{EB2BBEBD-D852-413C-A903-56B8F6ABC754}"/>
+                <a16:creationId xmlns:a16="http://schemas.microsoft.com/office/drawing/2014/main" xmlns="" id="{EB2BBEBD-D852-413C-A903-56B8F6ABC754}"/>
               </a:ext>
             </a:extLst>
           </p:cNvPr>
@@ -6937,7 +6937,7 @@
             <p:cNvPr id="8" name="TextBox 7">
               <a:extLst>
                 <a:ext uri="{FF2B5EF4-FFF2-40B4-BE49-F238E27FC236}">
-                  <a16:creationId xmlns:a16="http://schemas.microsoft.com/office/drawing/2014/main" id="{5CF5BDA4-10C7-46A6-AC30-523A3FC438AC}"/>
+                  <a16:creationId xmlns:a16="http://schemas.microsoft.com/office/drawing/2014/main" xmlns="" id="{5CF5BDA4-10C7-46A6-AC30-523A3FC438AC}"/>
                 </a:ext>
               </a:extLst>
             </p:cNvPr>
@@ -7017,7 +7017,7 @@
             <p:cNvPr id="9" name="TextBox 8">
               <a:extLst>
                 <a:ext uri="{FF2B5EF4-FFF2-40B4-BE49-F238E27FC236}">
-                  <a16:creationId xmlns:a16="http://schemas.microsoft.com/office/drawing/2014/main" id="{C062103B-F514-4BE9-B5B2-C13878D2FE7C}"/>
+                  <a16:creationId xmlns:a16="http://schemas.microsoft.com/office/drawing/2014/main" xmlns="" id="{C062103B-F514-4BE9-B5B2-C13878D2FE7C}"/>
                 </a:ext>
               </a:extLst>
             </p:cNvPr>
@@ -7070,7 +7070,7 @@
           <p:cNvPr id="2" name="Group 1">
             <a:extLst>
               <a:ext uri="{FF2B5EF4-FFF2-40B4-BE49-F238E27FC236}">
-                <a16:creationId xmlns:a16="http://schemas.microsoft.com/office/drawing/2014/main" id="{826AA191-D1D3-4579-B3BC-3E6929717B92}"/>
+                <a16:creationId xmlns:a16="http://schemas.microsoft.com/office/drawing/2014/main" xmlns="" id="{826AA191-D1D3-4579-B3BC-3E6929717B92}"/>
               </a:ext>
             </a:extLst>
           </p:cNvPr>
@@ -7095,7 +7095,7 @@
             <p:cNvPr id="29" name="Freeform: Shape 28">
               <a:extLst>
                 <a:ext uri="{FF2B5EF4-FFF2-40B4-BE49-F238E27FC236}">
-                  <a16:creationId xmlns:a16="http://schemas.microsoft.com/office/drawing/2014/main" id="{589EECD9-0B68-470E-940C-D972B7D2EBD2}"/>
+                  <a16:creationId xmlns:a16="http://schemas.microsoft.com/office/drawing/2014/main" xmlns="" id="{589EECD9-0B68-470E-940C-D972B7D2EBD2}"/>
                 </a:ext>
               </a:extLst>
             </p:cNvPr>
@@ -7955,7 +7955,7 @@
             <p:cNvPr id="22" name="Freeform: Shape 21">
               <a:extLst>
                 <a:ext uri="{FF2B5EF4-FFF2-40B4-BE49-F238E27FC236}">
-                  <a16:creationId xmlns:a16="http://schemas.microsoft.com/office/drawing/2014/main" id="{64012533-09CD-4823-81FA-2B187D83FE89}"/>
+                  <a16:creationId xmlns:a16="http://schemas.microsoft.com/office/drawing/2014/main" xmlns="" id="{64012533-09CD-4823-81FA-2B187D83FE89}"/>
                 </a:ext>
               </a:extLst>
             </p:cNvPr>
@@ -8900,7 +8900,7 @@
           <p:cNvPr id="4" name="Oval 3">
             <a:extLst>
               <a:ext uri="{FF2B5EF4-FFF2-40B4-BE49-F238E27FC236}">
-                <a16:creationId xmlns:a16="http://schemas.microsoft.com/office/drawing/2014/main" id="{5F64A327-3DCA-434C-B88A-792CACE97349}"/>
+                <a16:creationId xmlns:a16="http://schemas.microsoft.com/office/drawing/2014/main" xmlns="" id="{5F64A327-3DCA-434C-B88A-792CACE97349}"/>
               </a:ext>
             </a:extLst>
           </p:cNvPr>
@@ -8952,7 +8952,7 @@
           <p:cNvPr id="25" name="Oval 24">
             <a:extLst>
               <a:ext uri="{FF2B5EF4-FFF2-40B4-BE49-F238E27FC236}">
-                <a16:creationId xmlns:a16="http://schemas.microsoft.com/office/drawing/2014/main" id="{A6DDB6C0-B422-4631-AD9F-F3E4F35DEAEA}"/>
+                <a16:creationId xmlns:a16="http://schemas.microsoft.com/office/drawing/2014/main" xmlns="" id="{A6DDB6C0-B422-4631-AD9F-F3E4F35DEAEA}"/>
               </a:ext>
             </a:extLst>
           </p:cNvPr>
@@ -9004,7 +9004,7 @@
           <p:cNvPr id="29" name="Oval 28">
             <a:extLst>
               <a:ext uri="{FF2B5EF4-FFF2-40B4-BE49-F238E27FC236}">
-                <a16:creationId xmlns:a16="http://schemas.microsoft.com/office/drawing/2014/main" id="{3E7CE6E3-3A7F-4D25-A78F-419C6DD51E5F}"/>
+                <a16:creationId xmlns:a16="http://schemas.microsoft.com/office/drawing/2014/main" xmlns="" id="{3E7CE6E3-3A7F-4D25-A78F-419C6DD51E5F}"/>
               </a:ext>
             </a:extLst>
           </p:cNvPr>
@@ -9056,7 +9056,7 @@
           <p:cNvPr id="31" name="Oval 30">
             <a:extLst>
               <a:ext uri="{FF2B5EF4-FFF2-40B4-BE49-F238E27FC236}">
-                <a16:creationId xmlns:a16="http://schemas.microsoft.com/office/drawing/2014/main" id="{DFCDD07A-2B4F-403E-B5B3-61076DEFDDB6}"/>
+                <a16:creationId xmlns:a16="http://schemas.microsoft.com/office/drawing/2014/main" xmlns="" id="{DFCDD07A-2B4F-403E-B5B3-61076DEFDDB6}"/>
               </a:ext>
             </a:extLst>
           </p:cNvPr>
@@ -9108,7 +9108,7 @@
           <p:cNvPr id="9" name="TextBox 8">
             <a:extLst>
               <a:ext uri="{FF2B5EF4-FFF2-40B4-BE49-F238E27FC236}">
-                <a16:creationId xmlns:a16="http://schemas.microsoft.com/office/drawing/2014/main" id="{1394CF44-32FD-4475-AB6A-2CABCD1B2040}"/>
+                <a16:creationId xmlns:a16="http://schemas.microsoft.com/office/drawing/2014/main" xmlns="" id="{1394CF44-32FD-4475-AB6A-2CABCD1B2040}"/>
               </a:ext>
             </a:extLst>
           </p:cNvPr>
@@ -9160,7 +9160,7 @@
           <p:cNvPr id="6" name="TextBox 5">
             <a:extLst>
               <a:ext uri="{FF2B5EF4-FFF2-40B4-BE49-F238E27FC236}">
-                <a16:creationId xmlns:a16="http://schemas.microsoft.com/office/drawing/2014/main" id="{D82D9816-6FAC-48FF-989D-0AB99C1B9D36}"/>
+                <a16:creationId xmlns:a16="http://schemas.microsoft.com/office/drawing/2014/main" xmlns="" id="{D82D9816-6FAC-48FF-989D-0AB99C1B9D36}"/>
               </a:ext>
             </a:extLst>
           </p:cNvPr>
@@ -9207,7 +9207,7 @@
           <p:cNvPr id="15" name="TextBox 14">
             <a:extLst>
               <a:ext uri="{FF2B5EF4-FFF2-40B4-BE49-F238E27FC236}">
-                <a16:creationId xmlns:a16="http://schemas.microsoft.com/office/drawing/2014/main" id="{3621E465-EBCE-44C7-A461-8884575A2C05}"/>
+                <a16:creationId xmlns:a16="http://schemas.microsoft.com/office/drawing/2014/main" xmlns="" id="{3621E465-EBCE-44C7-A461-8884575A2C05}"/>
               </a:ext>
             </a:extLst>
           </p:cNvPr>
@@ -9271,7 +9271,7 @@
           <p:cNvPr id="12" name="TextBox 11">
             <a:extLst>
               <a:ext uri="{FF2B5EF4-FFF2-40B4-BE49-F238E27FC236}">
-                <a16:creationId xmlns:a16="http://schemas.microsoft.com/office/drawing/2014/main" id="{8CBBAF38-A046-44E2-BCAF-B6642CB6D3A9}"/>
+                <a16:creationId xmlns:a16="http://schemas.microsoft.com/office/drawing/2014/main" xmlns="" id="{8CBBAF38-A046-44E2-BCAF-B6642CB6D3A9}"/>
               </a:ext>
             </a:extLst>
           </p:cNvPr>
@@ -9318,7 +9318,7 @@
           <p:cNvPr id="21" name="TextBox 20">
             <a:extLst>
               <a:ext uri="{FF2B5EF4-FFF2-40B4-BE49-F238E27FC236}">
-                <a16:creationId xmlns:a16="http://schemas.microsoft.com/office/drawing/2014/main" id="{E91B12FA-16D2-427A-AC1E-7CD49A52D0EA}"/>
+                <a16:creationId xmlns:a16="http://schemas.microsoft.com/office/drawing/2014/main" xmlns="" id="{E91B12FA-16D2-427A-AC1E-7CD49A52D0EA}"/>
               </a:ext>
             </a:extLst>
           </p:cNvPr>
@@ -9382,7 +9382,7 @@
           <p:cNvPr id="18" name="TextBox 17">
             <a:extLst>
               <a:ext uri="{FF2B5EF4-FFF2-40B4-BE49-F238E27FC236}">
-                <a16:creationId xmlns:a16="http://schemas.microsoft.com/office/drawing/2014/main" id="{57EE194F-E1F1-4E6F-9B6B-C0FA013C93A8}"/>
+                <a16:creationId xmlns:a16="http://schemas.microsoft.com/office/drawing/2014/main" xmlns="" id="{57EE194F-E1F1-4E6F-9B6B-C0FA013C93A8}"/>
               </a:ext>
             </a:extLst>
           </p:cNvPr>
@@ -9429,7 +9429,7 @@
           <p:cNvPr id="27" name="TextBox 26">
             <a:extLst>
               <a:ext uri="{FF2B5EF4-FFF2-40B4-BE49-F238E27FC236}">
-                <a16:creationId xmlns:a16="http://schemas.microsoft.com/office/drawing/2014/main" id="{62E492E8-841B-4715-9250-E40BA22F15A3}"/>
+                <a16:creationId xmlns:a16="http://schemas.microsoft.com/office/drawing/2014/main" xmlns="" id="{62E492E8-841B-4715-9250-E40BA22F15A3}"/>
               </a:ext>
             </a:extLst>
           </p:cNvPr>
@@ -9481,7 +9481,7 @@
           <p:cNvPr id="24" name="TextBox 23">
             <a:extLst>
               <a:ext uri="{FF2B5EF4-FFF2-40B4-BE49-F238E27FC236}">
-                <a16:creationId xmlns:a16="http://schemas.microsoft.com/office/drawing/2014/main" id="{9372A78B-279E-4D57-ACC1-186AB3B9043B}"/>
+                <a16:creationId xmlns:a16="http://schemas.microsoft.com/office/drawing/2014/main" xmlns="" id="{9372A78B-279E-4D57-ACC1-186AB3B9043B}"/>
               </a:ext>
             </a:extLst>
           </p:cNvPr>
@@ -9558,7 +9558,7 @@
           <p:cNvPr id="2" name="TextBox 1">
             <a:extLst>
               <a:ext uri="{FF2B5EF4-FFF2-40B4-BE49-F238E27FC236}">
-                <a16:creationId xmlns:a16="http://schemas.microsoft.com/office/drawing/2014/main" id="{DC125716-4914-4DA9-9188-7583D7ABCF72}"/>
+                <a16:creationId xmlns:a16="http://schemas.microsoft.com/office/drawing/2014/main" xmlns="" id="{DC125716-4914-4DA9-9188-7583D7ABCF72}"/>
               </a:ext>
             </a:extLst>
           </p:cNvPr>
@@ -9610,7 +9610,7 @@
           <p:cNvPr id="4" name="TextBox 3">
             <a:extLst>
               <a:ext uri="{FF2B5EF4-FFF2-40B4-BE49-F238E27FC236}">
-                <a16:creationId xmlns:a16="http://schemas.microsoft.com/office/drawing/2014/main" id="{DC6495DE-9E00-4472-9479-384AB9308161}"/>
+                <a16:creationId xmlns:a16="http://schemas.microsoft.com/office/drawing/2014/main" xmlns="" id="{DC6495DE-9E00-4472-9479-384AB9308161}"/>
               </a:ext>
             </a:extLst>
           </p:cNvPr>
@@ -9694,7 +9694,7 @@
           <p:cNvPr id="2" name="Text Placeholder 1">
             <a:extLst>
               <a:ext uri="{FF2B5EF4-FFF2-40B4-BE49-F238E27FC236}">
-                <a16:creationId xmlns:a16="http://schemas.microsoft.com/office/drawing/2014/main" id="{D735F7F3-C1B5-4B60-A00A-4EB618DDFB5A}"/>
+                <a16:creationId xmlns:a16="http://schemas.microsoft.com/office/drawing/2014/main" xmlns="" id="{D735F7F3-C1B5-4B60-A00A-4EB618DDFB5A}"/>
               </a:ext>
             </a:extLst>
           </p:cNvPr>
@@ -9722,7 +9722,7 @@
           <p:cNvPr id="3" name="TextBox 2">
             <a:extLst>
               <a:ext uri="{FF2B5EF4-FFF2-40B4-BE49-F238E27FC236}">
-                <a16:creationId xmlns:a16="http://schemas.microsoft.com/office/drawing/2014/main" id="{B2494ED0-A5D7-4ADB-96B5-C78611EFA46A}"/>
+                <a16:creationId xmlns:a16="http://schemas.microsoft.com/office/drawing/2014/main" xmlns="" id="{B2494ED0-A5D7-4ADB-96B5-C78611EFA46A}"/>
               </a:ext>
             </a:extLst>
           </p:cNvPr>
@@ -9769,7 +9769,7 @@
           <p:cNvPr id="4" name="Group 3">
             <a:extLst>
               <a:ext uri="{FF2B5EF4-FFF2-40B4-BE49-F238E27FC236}">
-                <a16:creationId xmlns:a16="http://schemas.microsoft.com/office/drawing/2014/main" id="{955BF958-E4A7-4523-8762-DF5586F39E62}"/>
+                <a16:creationId xmlns:a16="http://schemas.microsoft.com/office/drawing/2014/main" xmlns="" id="{955BF958-E4A7-4523-8762-DF5586F39E62}"/>
               </a:ext>
             </a:extLst>
           </p:cNvPr>
@@ -9789,7 +9789,7 @@
             <p:cNvPr id="5" name="TextBox 4">
               <a:extLst>
                 <a:ext uri="{FF2B5EF4-FFF2-40B4-BE49-F238E27FC236}">
-                  <a16:creationId xmlns:a16="http://schemas.microsoft.com/office/drawing/2014/main" id="{8D033C87-1B55-4E40-920F-63F9C96B0E7D}"/>
+                  <a16:creationId xmlns:a16="http://schemas.microsoft.com/office/drawing/2014/main" xmlns="" id="{8D033C87-1B55-4E40-920F-63F9C96B0E7D}"/>
                 </a:ext>
               </a:extLst>
             </p:cNvPr>
@@ -9844,7 +9844,7 @@
             <p:cNvPr id="6" name="TextBox 5">
               <a:extLst>
                 <a:ext uri="{FF2B5EF4-FFF2-40B4-BE49-F238E27FC236}">
-                  <a16:creationId xmlns:a16="http://schemas.microsoft.com/office/drawing/2014/main" id="{3191ECFA-4A18-457B-8524-D7709BB716DD}"/>
+                  <a16:creationId xmlns:a16="http://schemas.microsoft.com/office/drawing/2014/main" xmlns="" id="{3191ECFA-4A18-457B-8524-D7709BB716DD}"/>
                 </a:ext>
               </a:extLst>
             </p:cNvPr>
@@ -9897,7 +9897,7 @@
           <p:cNvPr id="7" name="TextBox 6">
             <a:extLst>
               <a:ext uri="{FF2B5EF4-FFF2-40B4-BE49-F238E27FC236}">
-                <a16:creationId xmlns:a16="http://schemas.microsoft.com/office/drawing/2014/main" id="{6083A1EA-340D-4C1E-8292-4E5DAD3F0D4C}"/>
+                <a16:creationId xmlns:a16="http://schemas.microsoft.com/office/drawing/2014/main" xmlns="" id="{6083A1EA-340D-4C1E-8292-4E5DAD3F0D4C}"/>
               </a:ext>
             </a:extLst>
           </p:cNvPr>
@@ -9944,7 +9944,7 @@
           <p:cNvPr id="8" name="Group 7">
             <a:extLst>
               <a:ext uri="{FF2B5EF4-FFF2-40B4-BE49-F238E27FC236}">
-                <a16:creationId xmlns:a16="http://schemas.microsoft.com/office/drawing/2014/main" id="{1D875541-4335-412E-8A54-13684ED0FE6B}"/>
+                <a16:creationId xmlns:a16="http://schemas.microsoft.com/office/drawing/2014/main" xmlns="" id="{1D875541-4335-412E-8A54-13684ED0FE6B}"/>
               </a:ext>
             </a:extLst>
           </p:cNvPr>
@@ -9964,7 +9964,7 @@
             <p:cNvPr id="9" name="TextBox 8">
               <a:extLst>
                 <a:ext uri="{FF2B5EF4-FFF2-40B4-BE49-F238E27FC236}">
-                  <a16:creationId xmlns:a16="http://schemas.microsoft.com/office/drawing/2014/main" id="{32EB02B9-3644-4BAF-B8CB-126557B33046}"/>
+                  <a16:creationId xmlns:a16="http://schemas.microsoft.com/office/drawing/2014/main" xmlns="" id="{32EB02B9-3644-4BAF-B8CB-126557B33046}"/>
                 </a:ext>
               </a:extLst>
             </p:cNvPr>
@@ -10019,7 +10019,7 @@
             <p:cNvPr id="10" name="TextBox 9">
               <a:extLst>
                 <a:ext uri="{FF2B5EF4-FFF2-40B4-BE49-F238E27FC236}">
-                  <a16:creationId xmlns:a16="http://schemas.microsoft.com/office/drawing/2014/main" id="{FBD7909E-5756-4D2F-A7D5-FA329B155CC4}"/>
+                  <a16:creationId xmlns:a16="http://schemas.microsoft.com/office/drawing/2014/main" xmlns="" id="{FBD7909E-5756-4D2F-A7D5-FA329B155CC4}"/>
                 </a:ext>
               </a:extLst>
             </p:cNvPr>
@@ -10072,7 +10072,7 @@
           <p:cNvPr id="11" name="TextBox 10">
             <a:extLst>
               <a:ext uri="{FF2B5EF4-FFF2-40B4-BE49-F238E27FC236}">
-                <a16:creationId xmlns:a16="http://schemas.microsoft.com/office/drawing/2014/main" id="{FB7F9B4E-86E4-4C93-86F0-FC062EDEDD47}"/>
+                <a16:creationId xmlns:a16="http://schemas.microsoft.com/office/drawing/2014/main" xmlns="" id="{FB7F9B4E-86E4-4C93-86F0-FC062EDEDD47}"/>
               </a:ext>
             </a:extLst>
           </p:cNvPr>
@@ -10119,7 +10119,7 @@
           <p:cNvPr id="12" name="Group 11">
             <a:extLst>
               <a:ext uri="{FF2B5EF4-FFF2-40B4-BE49-F238E27FC236}">
-                <a16:creationId xmlns:a16="http://schemas.microsoft.com/office/drawing/2014/main" id="{1E3035D7-908A-4448-A7EC-D13C42BD5BF2}"/>
+                <a16:creationId xmlns:a16="http://schemas.microsoft.com/office/drawing/2014/main" xmlns="" id="{1E3035D7-908A-4448-A7EC-D13C42BD5BF2}"/>
               </a:ext>
             </a:extLst>
           </p:cNvPr>
@@ -10139,7 +10139,7 @@
             <p:cNvPr id="13" name="TextBox 12">
               <a:extLst>
                 <a:ext uri="{FF2B5EF4-FFF2-40B4-BE49-F238E27FC236}">
-                  <a16:creationId xmlns:a16="http://schemas.microsoft.com/office/drawing/2014/main" id="{FA00AF6D-6479-4DFE-8EFB-E9EAB58A536D}"/>
+                  <a16:creationId xmlns:a16="http://schemas.microsoft.com/office/drawing/2014/main" xmlns="" id="{FA00AF6D-6479-4DFE-8EFB-E9EAB58A536D}"/>
                 </a:ext>
               </a:extLst>
             </p:cNvPr>
@@ -10191,7 +10191,7 @@
             <p:cNvPr id="14" name="TextBox 13">
               <a:extLst>
                 <a:ext uri="{FF2B5EF4-FFF2-40B4-BE49-F238E27FC236}">
-                  <a16:creationId xmlns:a16="http://schemas.microsoft.com/office/drawing/2014/main" id="{B043CE92-89C6-4391-BEEE-705B55EA0052}"/>
+                  <a16:creationId xmlns:a16="http://schemas.microsoft.com/office/drawing/2014/main" xmlns="" id="{B043CE92-89C6-4391-BEEE-705B55EA0052}"/>
                 </a:ext>
               </a:extLst>
             </p:cNvPr>
@@ -10244,7 +10244,7 @@
           <p:cNvPr id="15" name="TextBox 14">
             <a:extLst>
               <a:ext uri="{FF2B5EF4-FFF2-40B4-BE49-F238E27FC236}">
-                <a16:creationId xmlns:a16="http://schemas.microsoft.com/office/drawing/2014/main" id="{A0081674-2641-4E28-A354-5407EB3BC03E}"/>
+                <a16:creationId xmlns:a16="http://schemas.microsoft.com/office/drawing/2014/main" xmlns="" id="{A0081674-2641-4E28-A354-5407EB3BC03E}"/>
               </a:ext>
             </a:extLst>
           </p:cNvPr>
@@ -10321,7 +10321,7 @@
           <p:cNvPr id="17" name="Graphic 84">
             <a:extLst>
               <a:ext uri="{FF2B5EF4-FFF2-40B4-BE49-F238E27FC236}">
-                <a16:creationId xmlns:a16="http://schemas.microsoft.com/office/drawing/2014/main" id="{BA7F5F5C-3463-490C-BD44-4A814FBE4D00}"/>
+                <a16:creationId xmlns:a16="http://schemas.microsoft.com/office/drawing/2014/main" xmlns="" id="{BA7F5F5C-3463-490C-BD44-4A814FBE4D00}"/>
               </a:ext>
             </a:extLst>
           </p:cNvPr>
@@ -11746,7 +11746,7 @@
           <p:cNvPr id="18" name="Freeform: Shape 17">
             <a:extLst>
               <a:ext uri="{FF2B5EF4-FFF2-40B4-BE49-F238E27FC236}">
-                <a16:creationId xmlns:a16="http://schemas.microsoft.com/office/drawing/2014/main" id="{56D246A8-D4E8-4327-AC43-2680A48C0892}"/>
+                <a16:creationId xmlns:a16="http://schemas.microsoft.com/office/drawing/2014/main" xmlns="" id="{56D246A8-D4E8-4327-AC43-2680A48C0892}"/>
               </a:ext>
             </a:extLst>
           </p:cNvPr>
@@ -13622,7 +13622,7 @@
           <p:cNvPr id="19" name="Graphic 11">
             <a:extLst>
               <a:ext uri="{FF2B5EF4-FFF2-40B4-BE49-F238E27FC236}">
-                <a16:creationId xmlns:a16="http://schemas.microsoft.com/office/drawing/2014/main" id="{F4B9A873-B96C-4EDD-B061-2C7D180AB2ED}"/>
+                <a16:creationId xmlns:a16="http://schemas.microsoft.com/office/drawing/2014/main" xmlns="" id="{F4B9A873-B96C-4EDD-B061-2C7D180AB2ED}"/>
               </a:ext>
             </a:extLst>
           </p:cNvPr>
@@ -15637,7 +15637,7 @@
           <p:cNvPr id="20" name="Group 19">
             <a:extLst>
               <a:ext uri="{FF2B5EF4-FFF2-40B4-BE49-F238E27FC236}">
-                <a16:creationId xmlns:a16="http://schemas.microsoft.com/office/drawing/2014/main" id="{5C0FA543-C9BB-46EB-BFF0-03E1F5669E49}"/>
+                <a16:creationId xmlns:a16="http://schemas.microsoft.com/office/drawing/2014/main" xmlns="" id="{5C0FA543-C9BB-46EB-BFF0-03E1F5669E49}"/>
               </a:ext>
             </a:extLst>
           </p:cNvPr>
@@ -15660,7 +15660,7 @@
             <p:cNvPr id="21" name="Graphic 11">
               <a:extLst>
                 <a:ext uri="{FF2B5EF4-FFF2-40B4-BE49-F238E27FC236}">
-                  <a16:creationId xmlns:a16="http://schemas.microsoft.com/office/drawing/2014/main" id="{92E928F6-C7EF-46E1-8158-B52543E9BA32}"/>
+                  <a16:creationId xmlns:a16="http://schemas.microsoft.com/office/drawing/2014/main" xmlns="" id="{92E928F6-C7EF-46E1-8158-B52543E9BA32}"/>
                 </a:ext>
               </a:extLst>
             </p:cNvPr>
@@ -15681,7 +15681,7 @@
               <p:cNvPr id="27" name="Freeform: Shape 26">
                 <a:extLst>
                   <a:ext uri="{FF2B5EF4-FFF2-40B4-BE49-F238E27FC236}">
-                    <a16:creationId xmlns:a16="http://schemas.microsoft.com/office/drawing/2014/main" id="{7C3A2BFB-0FAB-451E-8892-C661BC55A95E}"/>
+                    <a16:creationId xmlns:a16="http://schemas.microsoft.com/office/drawing/2014/main" xmlns="" id="{7C3A2BFB-0FAB-451E-8892-C661BC55A95E}"/>
                   </a:ext>
                 </a:extLst>
               </p:cNvPr>
@@ -16115,7 +16115,7 @@
               <p:cNvPr id="28" name="Freeform: Shape 27">
                 <a:extLst>
                   <a:ext uri="{FF2B5EF4-FFF2-40B4-BE49-F238E27FC236}">
-                    <a16:creationId xmlns:a16="http://schemas.microsoft.com/office/drawing/2014/main" id="{59E0DF4D-BFA8-4F31-8CA7-4A6C0A55BBCF}"/>
+                    <a16:creationId xmlns:a16="http://schemas.microsoft.com/office/drawing/2014/main" xmlns="" id="{59E0DF4D-BFA8-4F31-8CA7-4A6C0A55BBCF}"/>
                   </a:ext>
                 </a:extLst>
               </p:cNvPr>
@@ -16229,7 +16229,7 @@
               <p:cNvPr id="29" name="Freeform: Shape 28">
                 <a:extLst>
                   <a:ext uri="{FF2B5EF4-FFF2-40B4-BE49-F238E27FC236}">
-                    <a16:creationId xmlns:a16="http://schemas.microsoft.com/office/drawing/2014/main" id="{7AC1382A-3625-4E05-A45F-4727A0604848}"/>
+                    <a16:creationId xmlns:a16="http://schemas.microsoft.com/office/drawing/2014/main" xmlns="" id="{7AC1382A-3625-4E05-A45F-4727A0604848}"/>
                   </a:ext>
                 </a:extLst>
               </p:cNvPr>
@@ -16323,7 +16323,7 @@
               <p:cNvPr id="30" name="Freeform: Shape 29">
                 <a:extLst>
                   <a:ext uri="{FF2B5EF4-FFF2-40B4-BE49-F238E27FC236}">
-                    <a16:creationId xmlns:a16="http://schemas.microsoft.com/office/drawing/2014/main" id="{919ED7B0-3CDC-48C0-80A1-DF4437121E27}"/>
+                    <a16:creationId xmlns:a16="http://schemas.microsoft.com/office/drawing/2014/main" xmlns="" id="{919ED7B0-3CDC-48C0-80A1-DF4437121E27}"/>
                   </a:ext>
                 </a:extLst>
               </p:cNvPr>
@@ -16407,7 +16407,7 @@
               <p:cNvPr id="31" name="Freeform: Shape 30">
                 <a:extLst>
                   <a:ext uri="{FF2B5EF4-FFF2-40B4-BE49-F238E27FC236}">
-                    <a16:creationId xmlns:a16="http://schemas.microsoft.com/office/drawing/2014/main" id="{85C1C401-C48F-4FEF-8A31-A974086A8036}"/>
+                    <a16:creationId xmlns:a16="http://schemas.microsoft.com/office/drawing/2014/main" xmlns="" id="{85C1C401-C48F-4FEF-8A31-A974086A8036}"/>
                   </a:ext>
                 </a:extLst>
               </p:cNvPr>
@@ -16481,7 +16481,7 @@
               <p:cNvPr id="32" name="Freeform: Shape 31">
                 <a:extLst>
                   <a:ext uri="{FF2B5EF4-FFF2-40B4-BE49-F238E27FC236}">
-                    <a16:creationId xmlns:a16="http://schemas.microsoft.com/office/drawing/2014/main" id="{CAEE8570-A991-4050-A7F3-3CD3C4A1AE24}"/>
+                    <a16:creationId xmlns:a16="http://schemas.microsoft.com/office/drawing/2014/main" xmlns="" id="{CAEE8570-A991-4050-A7F3-3CD3C4A1AE24}"/>
                   </a:ext>
                 </a:extLst>
               </p:cNvPr>
@@ -16556,7 +16556,7 @@
             <p:cNvPr id="22" name="Graphic 5">
               <a:extLst>
                 <a:ext uri="{FF2B5EF4-FFF2-40B4-BE49-F238E27FC236}">
-                  <a16:creationId xmlns:a16="http://schemas.microsoft.com/office/drawing/2014/main" id="{4068BD07-F8F6-4084-B4B8-7DE7E77D770F}"/>
+                  <a16:creationId xmlns:a16="http://schemas.microsoft.com/office/drawing/2014/main" xmlns="" id="{4068BD07-F8F6-4084-B4B8-7DE7E77D770F}"/>
                 </a:ext>
               </a:extLst>
             </p:cNvPr>
@@ -16577,7 +16577,7 @@
               <p:cNvPr id="23" name="Freeform: Shape 22">
                 <a:extLst>
                   <a:ext uri="{FF2B5EF4-FFF2-40B4-BE49-F238E27FC236}">
-                    <a16:creationId xmlns:a16="http://schemas.microsoft.com/office/drawing/2014/main" id="{75E2F1C3-B1D9-486A-AA8D-9BE4B16F6D4F}"/>
+                    <a16:creationId xmlns:a16="http://schemas.microsoft.com/office/drawing/2014/main" xmlns="" id="{75E2F1C3-B1D9-486A-AA8D-9BE4B16F6D4F}"/>
                   </a:ext>
                 </a:extLst>
               </p:cNvPr>
@@ -16981,7 +16981,7 @@
               <p:cNvPr id="24" name="Freeform: Shape 23">
                 <a:extLst>
                   <a:ext uri="{FF2B5EF4-FFF2-40B4-BE49-F238E27FC236}">
-                    <a16:creationId xmlns:a16="http://schemas.microsoft.com/office/drawing/2014/main" id="{0FDC6466-E84A-439F-AD53-39301E93DE20}"/>
+                    <a16:creationId xmlns:a16="http://schemas.microsoft.com/office/drawing/2014/main" xmlns="" id="{0FDC6466-E84A-439F-AD53-39301E93DE20}"/>
                   </a:ext>
                 </a:extLst>
               </p:cNvPr>
@@ -17124,7 +17124,7 @@
               <p:cNvPr id="25" name="Freeform: Shape 24">
                 <a:extLst>
                   <a:ext uri="{FF2B5EF4-FFF2-40B4-BE49-F238E27FC236}">
-                    <a16:creationId xmlns:a16="http://schemas.microsoft.com/office/drawing/2014/main" id="{A5EE9CF2-6C0B-47A0-AE41-B961F9EADEB6}"/>
+                    <a16:creationId xmlns:a16="http://schemas.microsoft.com/office/drawing/2014/main" xmlns="" id="{A5EE9CF2-6C0B-47A0-AE41-B961F9EADEB6}"/>
                   </a:ext>
                 </a:extLst>
               </p:cNvPr>
@@ -17267,7 +17267,7 @@
               <p:cNvPr id="26" name="Freeform: Shape 25">
                 <a:extLst>
                   <a:ext uri="{FF2B5EF4-FFF2-40B4-BE49-F238E27FC236}">
-                    <a16:creationId xmlns:a16="http://schemas.microsoft.com/office/drawing/2014/main" id="{4A284BBC-3F0D-4D93-884F-88510ABAEA99}"/>
+                    <a16:creationId xmlns:a16="http://schemas.microsoft.com/office/drawing/2014/main" xmlns="" id="{4A284BBC-3F0D-4D93-884F-88510ABAEA99}"/>
                   </a:ext>
                 </a:extLst>
               </p:cNvPr>
@@ -17393,7 +17393,7 @@
           <p:cNvPr id="73" name="Group 72">
             <a:extLst>
               <a:ext uri="{FF2B5EF4-FFF2-40B4-BE49-F238E27FC236}">
-                <a16:creationId xmlns:a16="http://schemas.microsoft.com/office/drawing/2014/main" id="{B6B244E2-EC8F-4037-A852-D7A42F092CF3}"/>
+                <a16:creationId xmlns:a16="http://schemas.microsoft.com/office/drawing/2014/main" xmlns="" id="{B6B244E2-EC8F-4037-A852-D7A42F092CF3}"/>
               </a:ext>
             </a:extLst>
           </p:cNvPr>
@@ -17413,7 +17413,7 @@
             <p:cNvPr id="38" name="Group 37">
               <a:extLst>
                 <a:ext uri="{FF2B5EF4-FFF2-40B4-BE49-F238E27FC236}">
-                  <a16:creationId xmlns:a16="http://schemas.microsoft.com/office/drawing/2014/main" id="{BC7549AF-C5D8-42EB-8FF6-250C37A9BFF3}"/>
+                  <a16:creationId xmlns:a16="http://schemas.microsoft.com/office/drawing/2014/main" xmlns="" id="{BC7549AF-C5D8-42EB-8FF6-250C37A9BFF3}"/>
                 </a:ext>
               </a:extLst>
             </p:cNvPr>
@@ -17436,7 +17436,7 @@
               <p:cNvPr id="4" name="Freeform: Shape 3">
                 <a:extLst>
                   <a:ext uri="{FF2B5EF4-FFF2-40B4-BE49-F238E27FC236}">
-                    <a16:creationId xmlns:a16="http://schemas.microsoft.com/office/drawing/2014/main" id="{6B8E2174-BCEB-4B8E-8304-91C3DAF6B298}"/>
+                    <a16:creationId xmlns:a16="http://schemas.microsoft.com/office/drawing/2014/main" xmlns="" id="{6B8E2174-BCEB-4B8E-8304-91C3DAF6B298}"/>
                   </a:ext>
                 </a:extLst>
               </p:cNvPr>
@@ -21167,7 +21167,7 @@
               <p:cNvPr id="30" name="Freeform: Shape 29">
                 <a:extLst>
                   <a:ext uri="{FF2B5EF4-FFF2-40B4-BE49-F238E27FC236}">
-                    <a16:creationId xmlns:a16="http://schemas.microsoft.com/office/drawing/2014/main" id="{79FB80E7-DFA0-4FE9-ADB4-0BB970E27669}"/>
+                    <a16:creationId xmlns:a16="http://schemas.microsoft.com/office/drawing/2014/main" xmlns="" id="{79FB80E7-DFA0-4FE9-ADB4-0BB970E27669}"/>
                   </a:ext>
                 </a:extLst>
               </p:cNvPr>
@@ -21291,7 +21291,7 @@
               <p:cNvPr id="31" name="Freeform: Shape 30">
                 <a:extLst>
                   <a:ext uri="{FF2B5EF4-FFF2-40B4-BE49-F238E27FC236}">
-                    <a16:creationId xmlns:a16="http://schemas.microsoft.com/office/drawing/2014/main" id="{83486CF7-28B1-430B-81A9-1161D88126CE}"/>
+                    <a16:creationId xmlns:a16="http://schemas.microsoft.com/office/drawing/2014/main" xmlns="" id="{83486CF7-28B1-430B-81A9-1161D88126CE}"/>
                   </a:ext>
                 </a:extLst>
               </p:cNvPr>
@@ -21405,7 +21405,7 @@
               <p:cNvPr id="32" name="Freeform: Shape 31">
                 <a:extLst>
                   <a:ext uri="{FF2B5EF4-FFF2-40B4-BE49-F238E27FC236}">
-                    <a16:creationId xmlns:a16="http://schemas.microsoft.com/office/drawing/2014/main" id="{45E56781-1CD4-4C25-8A4B-D9771C9F2630}"/>
+                    <a16:creationId xmlns:a16="http://schemas.microsoft.com/office/drawing/2014/main" xmlns="" id="{45E56781-1CD4-4C25-8A4B-D9771C9F2630}"/>
                   </a:ext>
                 </a:extLst>
               </p:cNvPr>
@@ -21519,7 +21519,7 @@
               <p:cNvPr id="33" name="Freeform: Shape 32">
                 <a:extLst>
                   <a:ext uri="{FF2B5EF4-FFF2-40B4-BE49-F238E27FC236}">
-                    <a16:creationId xmlns:a16="http://schemas.microsoft.com/office/drawing/2014/main" id="{5A2AA564-D0ED-4037-8520-A4E81F39C00A}"/>
+                    <a16:creationId xmlns:a16="http://schemas.microsoft.com/office/drawing/2014/main" xmlns="" id="{5A2AA564-D0ED-4037-8520-A4E81F39C00A}"/>
                   </a:ext>
                 </a:extLst>
               </p:cNvPr>
@@ -21633,7 +21633,7 @@
               <p:cNvPr id="34" name="Freeform: Shape 33">
                 <a:extLst>
                   <a:ext uri="{FF2B5EF4-FFF2-40B4-BE49-F238E27FC236}">
-                    <a16:creationId xmlns:a16="http://schemas.microsoft.com/office/drawing/2014/main" id="{3A41A20B-1FF5-406D-9642-B3430418B2C0}"/>
+                    <a16:creationId xmlns:a16="http://schemas.microsoft.com/office/drawing/2014/main" xmlns="" id="{3A41A20B-1FF5-406D-9642-B3430418B2C0}"/>
                   </a:ext>
                 </a:extLst>
               </p:cNvPr>
@@ -21778,7 +21778,7 @@
             <p:cNvPr id="39" name="Group 38">
               <a:extLst>
                 <a:ext uri="{FF2B5EF4-FFF2-40B4-BE49-F238E27FC236}">
-                  <a16:creationId xmlns:a16="http://schemas.microsoft.com/office/drawing/2014/main" id="{4390A5BD-43E4-48AE-9EE3-E7E5EDB8DA7D}"/>
+                  <a16:creationId xmlns:a16="http://schemas.microsoft.com/office/drawing/2014/main" xmlns="" id="{4390A5BD-43E4-48AE-9EE3-E7E5EDB8DA7D}"/>
                 </a:ext>
               </a:extLst>
             </p:cNvPr>
@@ -21803,7 +21803,7 @@
               <p:cNvPr id="5" name="Freeform: Shape 4">
                 <a:extLst>
                   <a:ext uri="{FF2B5EF4-FFF2-40B4-BE49-F238E27FC236}">
-                    <a16:creationId xmlns:a16="http://schemas.microsoft.com/office/drawing/2014/main" id="{5EDB436D-7BDF-4B96-AF30-82D4EDA45E66}"/>
+                    <a16:creationId xmlns:a16="http://schemas.microsoft.com/office/drawing/2014/main" xmlns="" id="{5EDB436D-7BDF-4B96-AF30-82D4EDA45E66}"/>
                   </a:ext>
                 </a:extLst>
               </p:cNvPr>
@@ -22116,7 +22116,7 @@
               <p:cNvPr id="6" name="Freeform: Shape 5">
                 <a:extLst>
                   <a:ext uri="{FF2B5EF4-FFF2-40B4-BE49-F238E27FC236}">
-                    <a16:creationId xmlns:a16="http://schemas.microsoft.com/office/drawing/2014/main" id="{39EA7990-E155-4489-ACD2-3709B3178033}"/>
+                    <a16:creationId xmlns:a16="http://schemas.microsoft.com/office/drawing/2014/main" xmlns="" id="{39EA7990-E155-4489-ACD2-3709B3178033}"/>
                   </a:ext>
                 </a:extLst>
               </p:cNvPr>
@@ -22300,7 +22300,7 @@
               <p:cNvPr id="7" name="Freeform: Shape 6">
                 <a:extLst>
                   <a:ext uri="{FF2B5EF4-FFF2-40B4-BE49-F238E27FC236}">
-                    <a16:creationId xmlns:a16="http://schemas.microsoft.com/office/drawing/2014/main" id="{FE88BFD8-6FB2-4D9D-8AAF-C857830B3AEA}"/>
+                    <a16:creationId xmlns:a16="http://schemas.microsoft.com/office/drawing/2014/main" xmlns="" id="{FE88BFD8-6FB2-4D9D-8AAF-C857830B3AEA}"/>
                   </a:ext>
                 </a:extLst>
               </p:cNvPr>
@@ -22494,7 +22494,7 @@
               <p:cNvPr id="8" name="Freeform: Shape 7">
                 <a:extLst>
                   <a:ext uri="{FF2B5EF4-FFF2-40B4-BE49-F238E27FC236}">
-                    <a16:creationId xmlns:a16="http://schemas.microsoft.com/office/drawing/2014/main" id="{207DD643-6360-4070-BF7C-136F4DBFE602}"/>
+                    <a16:creationId xmlns:a16="http://schemas.microsoft.com/office/drawing/2014/main" xmlns="" id="{207DD643-6360-4070-BF7C-136F4DBFE602}"/>
                   </a:ext>
                 </a:extLst>
               </p:cNvPr>
@@ -22648,7 +22648,7 @@
               <p:cNvPr id="9" name="Freeform: Shape 8">
                 <a:extLst>
                   <a:ext uri="{FF2B5EF4-FFF2-40B4-BE49-F238E27FC236}">
-                    <a16:creationId xmlns:a16="http://schemas.microsoft.com/office/drawing/2014/main" id="{D2DFCD79-4A75-4A92-B635-5BC396F971B4}"/>
+                    <a16:creationId xmlns:a16="http://schemas.microsoft.com/office/drawing/2014/main" xmlns="" id="{D2DFCD79-4A75-4A92-B635-5BC396F971B4}"/>
                   </a:ext>
                 </a:extLst>
               </p:cNvPr>
@@ -22862,7 +22862,7 @@
               <p:cNvPr id="10" name="Freeform: Shape 9">
                 <a:extLst>
                   <a:ext uri="{FF2B5EF4-FFF2-40B4-BE49-F238E27FC236}">
-                    <a16:creationId xmlns:a16="http://schemas.microsoft.com/office/drawing/2014/main" id="{0EAC85F9-4B38-4B43-82C0-F899AB18EE57}"/>
+                    <a16:creationId xmlns:a16="http://schemas.microsoft.com/office/drawing/2014/main" xmlns="" id="{0EAC85F9-4B38-4B43-82C0-F899AB18EE57}"/>
                   </a:ext>
                 </a:extLst>
               </p:cNvPr>
@@ -23056,7 +23056,7 @@
               <p:cNvPr id="11" name="Freeform: Shape 10">
                 <a:extLst>
                   <a:ext uri="{FF2B5EF4-FFF2-40B4-BE49-F238E27FC236}">
-                    <a16:creationId xmlns:a16="http://schemas.microsoft.com/office/drawing/2014/main" id="{C52C0A80-7C92-4E0B-A9A2-1E61E0322AAE}"/>
+                    <a16:creationId xmlns:a16="http://schemas.microsoft.com/office/drawing/2014/main" xmlns="" id="{C52C0A80-7C92-4E0B-A9A2-1E61E0322AAE}"/>
                   </a:ext>
                 </a:extLst>
               </p:cNvPr>
@@ -23279,7 +23279,7 @@
               <p:cNvPr id="12" name="Freeform: Shape 11">
                 <a:extLst>
                   <a:ext uri="{FF2B5EF4-FFF2-40B4-BE49-F238E27FC236}">
-                    <a16:creationId xmlns:a16="http://schemas.microsoft.com/office/drawing/2014/main" id="{0605E4CC-07C3-4F19-B6AE-894DACDA6D7F}"/>
+                    <a16:creationId xmlns:a16="http://schemas.microsoft.com/office/drawing/2014/main" xmlns="" id="{0605E4CC-07C3-4F19-B6AE-894DACDA6D7F}"/>
                   </a:ext>
                 </a:extLst>
               </p:cNvPr>
@@ -23492,7 +23492,7 @@
               <p:cNvPr id="13" name="Freeform: Shape 12">
                 <a:extLst>
                   <a:ext uri="{FF2B5EF4-FFF2-40B4-BE49-F238E27FC236}">
-                    <a16:creationId xmlns:a16="http://schemas.microsoft.com/office/drawing/2014/main" id="{F9321EB7-7838-4B63-9342-B5C09EA08E7C}"/>
+                    <a16:creationId xmlns:a16="http://schemas.microsoft.com/office/drawing/2014/main" xmlns="" id="{F9321EB7-7838-4B63-9342-B5C09EA08E7C}"/>
                   </a:ext>
                 </a:extLst>
               </p:cNvPr>
@@ -23686,7 +23686,7 @@
               <p:cNvPr id="14" name="Freeform: Shape 13">
                 <a:extLst>
                   <a:ext uri="{FF2B5EF4-FFF2-40B4-BE49-F238E27FC236}">
-                    <a16:creationId xmlns:a16="http://schemas.microsoft.com/office/drawing/2014/main" id="{4B12F3FF-8135-46AA-8394-B214BBE67360}"/>
+                    <a16:creationId xmlns:a16="http://schemas.microsoft.com/office/drawing/2014/main" xmlns="" id="{4B12F3FF-8135-46AA-8394-B214BBE67360}"/>
                   </a:ext>
                 </a:extLst>
               </p:cNvPr>
@@ -23879,7 +23879,7 @@
               <p:cNvPr id="15" name="Freeform: Shape 14">
                 <a:extLst>
                   <a:ext uri="{FF2B5EF4-FFF2-40B4-BE49-F238E27FC236}">
-                    <a16:creationId xmlns:a16="http://schemas.microsoft.com/office/drawing/2014/main" id="{6737C3FE-B296-45B5-B55B-5E149D74FF62}"/>
+                    <a16:creationId xmlns:a16="http://schemas.microsoft.com/office/drawing/2014/main" xmlns="" id="{6737C3FE-B296-45B5-B55B-5E149D74FF62}"/>
                   </a:ext>
                 </a:extLst>
               </p:cNvPr>
@@ -24082,7 +24082,7 @@
               <p:cNvPr id="16" name="Freeform: Shape 15">
                 <a:extLst>
                   <a:ext uri="{FF2B5EF4-FFF2-40B4-BE49-F238E27FC236}">
-                    <a16:creationId xmlns:a16="http://schemas.microsoft.com/office/drawing/2014/main" id="{3FC66149-40C6-4002-BF0D-D569040E0A73}"/>
+                    <a16:creationId xmlns:a16="http://schemas.microsoft.com/office/drawing/2014/main" xmlns="" id="{3FC66149-40C6-4002-BF0D-D569040E0A73}"/>
                   </a:ext>
                 </a:extLst>
               </p:cNvPr>
@@ -24315,7 +24315,7 @@
               <p:cNvPr id="17" name="Freeform: Shape 16">
                 <a:extLst>
                   <a:ext uri="{FF2B5EF4-FFF2-40B4-BE49-F238E27FC236}">
-                    <a16:creationId xmlns:a16="http://schemas.microsoft.com/office/drawing/2014/main" id="{EB256484-64BC-41F7-B36B-EC4DD90CF4C8}"/>
+                    <a16:creationId xmlns:a16="http://schemas.microsoft.com/office/drawing/2014/main" xmlns="" id="{EB256484-64BC-41F7-B36B-EC4DD90CF4C8}"/>
                   </a:ext>
                 </a:extLst>
               </p:cNvPr>
@@ -24579,7 +24579,7 @@
               <p:cNvPr id="18" name="Freeform: Shape 17">
                 <a:extLst>
                   <a:ext uri="{FF2B5EF4-FFF2-40B4-BE49-F238E27FC236}">
-                    <a16:creationId xmlns:a16="http://schemas.microsoft.com/office/drawing/2014/main" id="{5BF2DC3D-2653-44D0-BA06-A707E61CA85D}"/>
+                    <a16:creationId xmlns:a16="http://schemas.microsoft.com/office/drawing/2014/main" xmlns="" id="{5BF2DC3D-2653-44D0-BA06-A707E61CA85D}"/>
                   </a:ext>
                 </a:extLst>
               </p:cNvPr>
@@ -24792,7 +24792,7 @@
               <p:cNvPr id="19" name="Freeform: Shape 18">
                 <a:extLst>
                   <a:ext uri="{FF2B5EF4-FFF2-40B4-BE49-F238E27FC236}">
-                    <a16:creationId xmlns:a16="http://schemas.microsoft.com/office/drawing/2014/main" id="{F5C65E22-75A7-48F1-BB82-81D17D320CA8}"/>
+                    <a16:creationId xmlns:a16="http://schemas.microsoft.com/office/drawing/2014/main" xmlns="" id="{F5C65E22-75A7-48F1-BB82-81D17D320CA8}"/>
                   </a:ext>
                 </a:extLst>
               </p:cNvPr>
@@ -25016,7 +25016,7 @@
               <p:cNvPr id="20" name="Freeform: Shape 19">
                 <a:extLst>
                   <a:ext uri="{FF2B5EF4-FFF2-40B4-BE49-F238E27FC236}">
-                    <a16:creationId xmlns:a16="http://schemas.microsoft.com/office/drawing/2014/main" id="{6E4B58C2-54E8-488A-86AC-77E8B8CA4140}"/>
+                    <a16:creationId xmlns:a16="http://schemas.microsoft.com/office/drawing/2014/main" xmlns="" id="{6E4B58C2-54E8-488A-86AC-77E8B8CA4140}"/>
                   </a:ext>
                 </a:extLst>
               </p:cNvPr>
@@ -25299,7 +25299,7 @@
               <p:cNvPr id="21" name="Freeform: Shape 20">
                 <a:extLst>
                   <a:ext uri="{FF2B5EF4-FFF2-40B4-BE49-F238E27FC236}">
-                    <a16:creationId xmlns:a16="http://schemas.microsoft.com/office/drawing/2014/main" id="{86F52F15-9C0B-4B54-BBDF-8F2F4A7E9DB8}"/>
+                    <a16:creationId xmlns:a16="http://schemas.microsoft.com/office/drawing/2014/main" xmlns="" id="{86F52F15-9C0B-4B54-BBDF-8F2F4A7E9DB8}"/>
                   </a:ext>
                 </a:extLst>
               </p:cNvPr>
@@ -25583,7 +25583,7 @@
               <p:cNvPr id="22" name="Freeform: Shape 21">
                 <a:extLst>
                   <a:ext uri="{FF2B5EF4-FFF2-40B4-BE49-F238E27FC236}">
-                    <a16:creationId xmlns:a16="http://schemas.microsoft.com/office/drawing/2014/main" id="{335DD76F-07C4-4E00-B8FD-824BD5D96758}"/>
+                    <a16:creationId xmlns:a16="http://schemas.microsoft.com/office/drawing/2014/main" xmlns="" id="{335DD76F-07C4-4E00-B8FD-824BD5D96758}"/>
                   </a:ext>
                 </a:extLst>
               </p:cNvPr>
@@ -25896,7 +25896,7 @@
               <p:cNvPr id="23" name="Freeform: Shape 22">
                 <a:extLst>
                   <a:ext uri="{FF2B5EF4-FFF2-40B4-BE49-F238E27FC236}">
-                    <a16:creationId xmlns:a16="http://schemas.microsoft.com/office/drawing/2014/main" id="{98C38F46-3FA0-4F40-87A1-9DF50537D649}"/>
+                    <a16:creationId xmlns:a16="http://schemas.microsoft.com/office/drawing/2014/main" xmlns="" id="{98C38F46-3FA0-4F40-87A1-9DF50537D649}"/>
                   </a:ext>
                 </a:extLst>
               </p:cNvPr>
@@ -26180,7 +26180,7 @@
               <p:cNvPr id="24" name="Freeform: Shape 23">
                 <a:extLst>
                   <a:ext uri="{FF2B5EF4-FFF2-40B4-BE49-F238E27FC236}">
-                    <a16:creationId xmlns:a16="http://schemas.microsoft.com/office/drawing/2014/main" id="{8D75B816-B294-4700-B913-DFC699489875}"/>
+                    <a16:creationId xmlns:a16="http://schemas.microsoft.com/office/drawing/2014/main" xmlns="" id="{8D75B816-B294-4700-B913-DFC699489875}"/>
                   </a:ext>
                 </a:extLst>
               </p:cNvPr>
@@ -26374,7 +26374,7 @@
               <p:cNvPr id="25" name="Freeform: Shape 24">
                 <a:extLst>
                   <a:ext uri="{FF2B5EF4-FFF2-40B4-BE49-F238E27FC236}">
-                    <a16:creationId xmlns:a16="http://schemas.microsoft.com/office/drawing/2014/main" id="{792F2189-FA3E-461D-B660-A9DE20453CCE}"/>
+                    <a16:creationId xmlns:a16="http://schemas.microsoft.com/office/drawing/2014/main" xmlns="" id="{792F2189-FA3E-461D-B660-A9DE20453CCE}"/>
                   </a:ext>
                 </a:extLst>
               </p:cNvPr>
@@ -26618,7 +26618,7 @@
               <p:cNvPr id="26" name="Freeform: Shape 25">
                 <a:extLst>
                   <a:ext uri="{FF2B5EF4-FFF2-40B4-BE49-F238E27FC236}">
-                    <a16:creationId xmlns:a16="http://schemas.microsoft.com/office/drawing/2014/main" id="{AA4F5309-7A89-4A77-8AB8-61960456A0B7}"/>
+                    <a16:creationId xmlns:a16="http://schemas.microsoft.com/office/drawing/2014/main" xmlns="" id="{AA4F5309-7A89-4A77-8AB8-61960456A0B7}"/>
                   </a:ext>
                 </a:extLst>
               </p:cNvPr>
@@ -26802,7 +26802,7 @@
               <p:cNvPr id="27" name="Freeform: Shape 26">
                 <a:extLst>
                   <a:ext uri="{FF2B5EF4-FFF2-40B4-BE49-F238E27FC236}">
-                    <a16:creationId xmlns:a16="http://schemas.microsoft.com/office/drawing/2014/main" id="{B3210810-BEB2-4235-9162-A9E8532822BC}"/>
+                    <a16:creationId xmlns:a16="http://schemas.microsoft.com/office/drawing/2014/main" xmlns="" id="{B3210810-BEB2-4235-9162-A9E8532822BC}"/>
                   </a:ext>
                 </a:extLst>
               </p:cNvPr>
@@ -27016,7 +27016,7 @@
               <p:cNvPr id="28" name="Freeform: Shape 27">
                 <a:extLst>
                   <a:ext uri="{FF2B5EF4-FFF2-40B4-BE49-F238E27FC236}">
-                    <a16:creationId xmlns:a16="http://schemas.microsoft.com/office/drawing/2014/main" id="{7620AC3D-FA42-43E2-B891-36EACC452B85}"/>
+                    <a16:creationId xmlns:a16="http://schemas.microsoft.com/office/drawing/2014/main" xmlns="" id="{7620AC3D-FA42-43E2-B891-36EACC452B85}"/>
                   </a:ext>
                 </a:extLst>
               </p:cNvPr>
@@ -27220,7 +27220,7 @@
               <p:cNvPr id="29" name="Freeform: Shape 28">
                 <a:extLst>
                   <a:ext uri="{FF2B5EF4-FFF2-40B4-BE49-F238E27FC236}">
-                    <a16:creationId xmlns:a16="http://schemas.microsoft.com/office/drawing/2014/main" id="{E76B6851-C60F-4F3F-847E-73B486AAEF6E}"/>
+                    <a16:creationId xmlns:a16="http://schemas.microsoft.com/office/drawing/2014/main" xmlns="" id="{E76B6851-C60F-4F3F-847E-73B486AAEF6E}"/>
                   </a:ext>
                 </a:extLst>
               </p:cNvPr>
@@ -27443,7 +27443,7 @@
               <p:cNvPr id="35" name="Freeform: Shape 34">
                 <a:extLst>
                   <a:ext uri="{FF2B5EF4-FFF2-40B4-BE49-F238E27FC236}">
-                    <a16:creationId xmlns:a16="http://schemas.microsoft.com/office/drawing/2014/main" id="{257551D2-2447-494B-9E3B-688B9F96AFD6}"/>
+                    <a16:creationId xmlns:a16="http://schemas.microsoft.com/office/drawing/2014/main" xmlns="" id="{257551D2-2447-494B-9E3B-688B9F96AFD6}"/>
                   </a:ext>
                 </a:extLst>
               </p:cNvPr>
@@ -27537,7 +27537,7 @@
               <p:cNvPr id="36" name="Freeform: Shape 35">
                 <a:extLst>
                   <a:ext uri="{FF2B5EF4-FFF2-40B4-BE49-F238E27FC236}">
-                    <a16:creationId xmlns:a16="http://schemas.microsoft.com/office/drawing/2014/main" id="{E74B8C40-F570-41E4-848B-2ACDE40058EF}"/>
+                    <a16:creationId xmlns:a16="http://schemas.microsoft.com/office/drawing/2014/main" xmlns="" id="{E74B8C40-F570-41E4-848B-2ACDE40058EF}"/>
                   </a:ext>
                 </a:extLst>
               </p:cNvPr>
@@ -27631,7 +27631,7 @@
               <p:cNvPr id="37" name="Freeform: Shape 36">
                 <a:extLst>
                   <a:ext uri="{FF2B5EF4-FFF2-40B4-BE49-F238E27FC236}">
-                    <a16:creationId xmlns:a16="http://schemas.microsoft.com/office/drawing/2014/main" id="{E1E28528-C51B-4DBD-AD88-A6142E8895E7}"/>
+                    <a16:creationId xmlns:a16="http://schemas.microsoft.com/office/drawing/2014/main" xmlns="" id="{E1E28528-C51B-4DBD-AD88-A6142E8895E7}"/>
                   </a:ext>
                 </a:extLst>
               </p:cNvPr>
@@ -27757,7 +27757,7 @@
           <p:cNvPr id="40" name="Rectangle 39">
             <a:extLst>
               <a:ext uri="{FF2B5EF4-FFF2-40B4-BE49-F238E27FC236}">
-                <a16:creationId xmlns:a16="http://schemas.microsoft.com/office/drawing/2014/main" id="{E7217CB2-5031-44B4-8A1C-03E6D2F02B1B}"/>
+                <a16:creationId xmlns:a16="http://schemas.microsoft.com/office/drawing/2014/main" xmlns="" id="{E7217CB2-5031-44B4-8A1C-03E6D2F02B1B}"/>
               </a:ext>
             </a:extLst>
           </p:cNvPr>
@@ -27806,7 +27806,7 @@
           <p:cNvPr id="41" name="Frame 40">
             <a:extLst>
               <a:ext uri="{FF2B5EF4-FFF2-40B4-BE49-F238E27FC236}">
-                <a16:creationId xmlns:a16="http://schemas.microsoft.com/office/drawing/2014/main" id="{FDD5B833-2BB5-4AF9-A18D-D93344E3837C}"/>
+                <a16:creationId xmlns:a16="http://schemas.microsoft.com/office/drawing/2014/main" xmlns="" id="{FDD5B833-2BB5-4AF9-A18D-D93344E3837C}"/>
               </a:ext>
             </a:extLst>
           </p:cNvPr>
@@ -27861,7 +27861,7 @@
           <p:cNvPr id="59" name="TextBox 58">
             <a:extLst>
               <a:ext uri="{FF2B5EF4-FFF2-40B4-BE49-F238E27FC236}">
-                <a16:creationId xmlns:a16="http://schemas.microsoft.com/office/drawing/2014/main" id="{245E109C-33F9-4682-A860-8A7445DCEBE7}"/>
+                <a16:creationId xmlns:a16="http://schemas.microsoft.com/office/drawing/2014/main" xmlns="" id="{245E109C-33F9-4682-A860-8A7445DCEBE7}"/>
               </a:ext>
             </a:extLst>
           </p:cNvPr>
@@ -27907,7 +27907,7 @@
           <p:cNvPr id="64" name="TextBox 63">
             <a:extLst>
               <a:ext uri="{FF2B5EF4-FFF2-40B4-BE49-F238E27FC236}">
-                <a16:creationId xmlns:a16="http://schemas.microsoft.com/office/drawing/2014/main" id="{9B0F63CA-9C4E-4353-91B1-CB5C7B5E423F}"/>
+                <a16:creationId xmlns:a16="http://schemas.microsoft.com/office/drawing/2014/main" xmlns="" id="{9B0F63CA-9C4E-4353-91B1-CB5C7B5E423F}"/>
               </a:ext>
             </a:extLst>
           </p:cNvPr>
@@ -27953,7 +27953,7 @@
           <p:cNvPr id="69" name="TextBox 68">
             <a:extLst>
               <a:ext uri="{FF2B5EF4-FFF2-40B4-BE49-F238E27FC236}">
-                <a16:creationId xmlns:a16="http://schemas.microsoft.com/office/drawing/2014/main" id="{8046D315-F0BC-42C8-9874-7D421129B695}"/>
+                <a16:creationId xmlns:a16="http://schemas.microsoft.com/office/drawing/2014/main" xmlns="" id="{8046D315-F0BC-42C8-9874-7D421129B695}"/>
               </a:ext>
             </a:extLst>
           </p:cNvPr>
@@ -27999,7 +27999,7 @@
           <p:cNvPr id="100" name="Freeform: Shape 99">
             <a:extLst>
               <a:ext uri="{FF2B5EF4-FFF2-40B4-BE49-F238E27FC236}">
-                <a16:creationId xmlns:a16="http://schemas.microsoft.com/office/drawing/2014/main" id="{66AD8F4C-E567-4D0E-97E1-C1F921BBE61D}"/>
+                <a16:creationId xmlns:a16="http://schemas.microsoft.com/office/drawing/2014/main" xmlns="" id="{66AD8F4C-E567-4D0E-97E1-C1F921BBE61D}"/>
               </a:ext>
             </a:extLst>
           </p:cNvPr>
@@ -28176,7 +28176,7 @@
           <p:cNvPr id="103" name="Freeform: Shape 102">
             <a:extLst>
               <a:ext uri="{FF2B5EF4-FFF2-40B4-BE49-F238E27FC236}">
-                <a16:creationId xmlns:a16="http://schemas.microsoft.com/office/drawing/2014/main" id="{4BAD8A23-CEE9-47C7-B965-60ED4ABC1C3F}"/>
+                <a16:creationId xmlns:a16="http://schemas.microsoft.com/office/drawing/2014/main" xmlns="" id="{4BAD8A23-CEE9-47C7-B965-60ED4ABC1C3F}"/>
               </a:ext>
             </a:extLst>
           </p:cNvPr>
@@ -28695,7 +28695,7 @@
           <p:cNvPr id="109" name="그룹 30">
             <a:extLst>
               <a:ext uri="{FF2B5EF4-FFF2-40B4-BE49-F238E27FC236}">
-                <a16:creationId xmlns:a16="http://schemas.microsoft.com/office/drawing/2014/main" id="{1B8631CA-34D3-4619-8FA0-5F941E33DC47}"/>
+                <a16:creationId xmlns:a16="http://schemas.microsoft.com/office/drawing/2014/main" xmlns="" id="{1B8631CA-34D3-4619-8FA0-5F941E33DC47}"/>
               </a:ext>
             </a:extLst>
           </p:cNvPr>
@@ -28718,7 +28718,7 @@
             <p:cNvPr id="110" name="Freeform 18">
               <a:extLst>
                 <a:ext uri="{FF2B5EF4-FFF2-40B4-BE49-F238E27FC236}">
-                  <a16:creationId xmlns:a16="http://schemas.microsoft.com/office/drawing/2014/main" id="{C3C62006-81A3-4206-AA9F-E05B0D74AFF7}"/>
+                  <a16:creationId xmlns:a16="http://schemas.microsoft.com/office/drawing/2014/main" xmlns="" id="{C3C62006-81A3-4206-AA9F-E05B0D74AFF7}"/>
                 </a:ext>
               </a:extLst>
             </p:cNvPr>
@@ -28980,7 +28980,7 @@
             <p:cNvPr id="111" name="타원 32">
               <a:extLst>
                 <a:ext uri="{FF2B5EF4-FFF2-40B4-BE49-F238E27FC236}">
-                  <a16:creationId xmlns:a16="http://schemas.microsoft.com/office/drawing/2014/main" id="{5164A3F9-A1D6-420F-8EC0-EAEB92C89F5F}"/>
+                  <a16:creationId xmlns:a16="http://schemas.microsoft.com/office/drawing/2014/main" xmlns="" id="{5164A3F9-A1D6-420F-8EC0-EAEB92C89F5F}"/>
                 </a:ext>
               </a:extLst>
             </p:cNvPr>
@@ -29030,7 +29030,7 @@
             <p:cNvPr id="112" name="타원 33">
               <a:extLst>
                 <a:ext uri="{FF2B5EF4-FFF2-40B4-BE49-F238E27FC236}">
-                  <a16:creationId xmlns:a16="http://schemas.microsoft.com/office/drawing/2014/main" id="{B5986EFF-E323-4035-9CEF-2AA0914A74C7}"/>
+                  <a16:creationId xmlns:a16="http://schemas.microsoft.com/office/drawing/2014/main" xmlns="" id="{B5986EFF-E323-4035-9CEF-2AA0914A74C7}"/>
                 </a:ext>
               </a:extLst>
             </p:cNvPr>
@@ -29080,7 +29080,7 @@
             <p:cNvPr id="113" name="타원 34">
               <a:extLst>
                 <a:ext uri="{FF2B5EF4-FFF2-40B4-BE49-F238E27FC236}">
-                  <a16:creationId xmlns:a16="http://schemas.microsoft.com/office/drawing/2014/main" id="{7178E6F6-08B0-4BBD-B569-B709A63374FB}"/>
+                  <a16:creationId xmlns:a16="http://schemas.microsoft.com/office/drawing/2014/main" xmlns="" id="{7178E6F6-08B0-4BBD-B569-B709A63374FB}"/>
                 </a:ext>
               </a:extLst>
             </p:cNvPr>
@@ -29130,7 +29130,7 @@
             <p:cNvPr id="114" name="타원 35">
               <a:extLst>
                 <a:ext uri="{FF2B5EF4-FFF2-40B4-BE49-F238E27FC236}">
-                  <a16:creationId xmlns:a16="http://schemas.microsoft.com/office/drawing/2014/main" id="{189E107B-1CD9-4976-8E3A-3898260CE309}"/>
+                  <a16:creationId xmlns:a16="http://schemas.microsoft.com/office/drawing/2014/main" xmlns="" id="{189E107B-1CD9-4976-8E3A-3898260CE309}"/>
                 </a:ext>
               </a:extLst>
             </p:cNvPr>
@@ -29180,7 +29180,7 @@
             <p:cNvPr id="115" name="타원 36">
               <a:extLst>
                 <a:ext uri="{FF2B5EF4-FFF2-40B4-BE49-F238E27FC236}">
-                  <a16:creationId xmlns:a16="http://schemas.microsoft.com/office/drawing/2014/main" id="{C8D00B17-0186-4860-8F62-F9B965182EF0}"/>
+                  <a16:creationId xmlns:a16="http://schemas.microsoft.com/office/drawing/2014/main" xmlns="" id="{C8D00B17-0186-4860-8F62-F9B965182EF0}"/>
                 </a:ext>
               </a:extLst>
             </p:cNvPr>
@@ -29230,7 +29230,7 @@
             <p:cNvPr id="116" name="사각형: 둥근 모서리 37">
               <a:extLst>
                 <a:ext uri="{FF2B5EF4-FFF2-40B4-BE49-F238E27FC236}">
-                  <a16:creationId xmlns:a16="http://schemas.microsoft.com/office/drawing/2014/main" id="{19240367-AF30-42FC-A0AB-DEAA81E0A00F}"/>
+                  <a16:creationId xmlns:a16="http://schemas.microsoft.com/office/drawing/2014/main" xmlns="" id="{19240367-AF30-42FC-A0AB-DEAA81E0A00F}"/>
                 </a:ext>
               </a:extLst>
             </p:cNvPr>
@@ -29282,7 +29282,7 @@
             <p:cNvPr id="117" name="사각형: 둥근 모서리 38">
               <a:extLst>
                 <a:ext uri="{FF2B5EF4-FFF2-40B4-BE49-F238E27FC236}">
-                  <a16:creationId xmlns:a16="http://schemas.microsoft.com/office/drawing/2014/main" id="{BF3066DE-9DD3-4508-B7E1-A95B76212F81}"/>
+                  <a16:creationId xmlns:a16="http://schemas.microsoft.com/office/drawing/2014/main" xmlns="" id="{BF3066DE-9DD3-4508-B7E1-A95B76212F81}"/>
                 </a:ext>
               </a:extLst>
             </p:cNvPr>
@@ -29335,7 +29335,7 @@
           <p:cNvPr id="124" name="Freeform: Shape 123">
             <a:extLst>
               <a:ext uri="{FF2B5EF4-FFF2-40B4-BE49-F238E27FC236}">
-                <a16:creationId xmlns:a16="http://schemas.microsoft.com/office/drawing/2014/main" id="{0CFD6C4B-6E98-4F61-AFD4-6B9B889A4041}"/>
+                <a16:creationId xmlns:a16="http://schemas.microsoft.com/office/drawing/2014/main" xmlns="" id="{0CFD6C4B-6E98-4F61-AFD4-6B9B889A4041}"/>
               </a:ext>
             </a:extLst>
           </p:cNvPr>
@@ -30002,7 +30002,7 @@
           <p:cNvPr id="173" name="Freeform: Shape 172">
             <a:extLst>
               <a:ext uri="{FF2B5EF4-FFF2-40B4-BE49-F238E27FC236}">
-                <a16:creationId xmlns:a16="http://schemas.microsoft.com/office/drawing/2014/main" id="{3AB87447-BC92-477D-A4DE-587ACBF3C781}"/>
+                <a16:creationId xmlns:a16="http://schemas.microsoft.com/office/drawing/2014/main" xmlns="" id="{3AB87447-BC92-477D-A4DE-587ACBF3C781}"/>
               </a:ext>
             </a:extLst>
           </p:cNvPr>
@@ -36667,6 +36667,13 @@
   <p:clrMapOvr>
     <a:masterClrMapping/>
   </p:clrMapOvr>
+  <p:timing>
+    <p:tnLst>
+      <p:par>
+        <p:cTn id="1" dur="indefinite" restart="never" nodeType="tmRoot"/>
+      </p:par>
+    </p:tnLst>
+  </p:timing>
 </p:sld>
 </file>
 
@@ -36692,7 +36699,7 @@
           <p:cNvPr id="2" name="Text Placeholder 1">
             <a:extLst>
               <a:ext uri="{FF2B5EF4-FFF2-40B4-BE49-F238E27FC236}">
-                <a16:creationId xmlns:a16="http://schemas.microsoft.com/office/drawing/2014/main" id="{D735F7F3-C1B5-4B60-A00A-4EB618DDFB5A}"/>
+                <a16:creationId xmlns:a16="http://schemas.microsoft.com/office/drawing/2014/main" xmlns="" id="{D735F7F3-C1B5-4B60-A00A-4EB618DDFB5A}"/>
               </a:ext>
             </a:extLst>
           </p:cNvPr>
@@ -36721,7 +36728,7 @@
           <p:cNvPr id="10" name="TextBox 9">
             <a:extLst>
               <a:ext uri="{FF2B5EF4-FFF2-40B4-BE49-F238E27FC236}">
-                <a16:creationId xmlns:a16="http://schemas.microsoft.com/office/drawing/2014/main" id="{F5D121EF-2CB8-43A3-A82A-61FA1AA025B6}"/>
+                <a16:creationId xmlns:a16="http://schemas.microsoft.com/office/drawing/2014/main" xmlns="" id="{F5D121EF-2CB8-43A3-A82A-61FA1AA025B6}"/>
               </a:ext>
             </a:extLst>
           </p:cNvPr>
@@ -36744,7 +36751,7 @@
           </a:bodyPr>
           <a:lstStyle/>
           <a:p>
-            <a:pPr algn="r"/>
+            <a:pPr algn="just"/>
             <a:r>
               <a:rPr lang="en-US" altLang="ko-KR" sz="1400" b="1" dirty="0">
                 <a:solidFill>
@@ -36768,7 +36775,7 @@
           <p:cNvPr id="11" name="TextBox 10">
             <a:extLst>
               <a:ext uri="{FF2B5EF4-FFF2-40B4-BE49-F238E27FC236}">
-                <a16:creationId xmlns:a16="http://schemas.microsoft.com/office/drawing/2014/main" id="{7563135E-CF8C-4E6E-9FB9-DED8350FE9C0}"/>
+                <a16:creationId xmlns:a16="http://schemas.microsoft.com/office/drawing/2014/main" xmlns="" id="{7563135E-CF8C-4E6E-9FB9-DED8350FE9C0}"/>
               </a:ext>
             </a:extLst>
           </p:cNvPr>
@@ -36791,6 +36798,7 @@
           </a:bodyPr>
           <a:lstStyle/>
           <a:p>
+            <a:pPr algn="just"/>
             <a:r>
               <a:rPr lang="en-US" altLang="ko-KR" sz="1400" b="1" dirty="0">
                 <a:solidFill>
@@ -36814,7 +36822,7 @@
           <p:cNvPr id="23" name="Oval 7">
             <a:extLst>
               <a:ext uri="{FF2B5EF4-FFF2-40B4-BE49-F238E27FC236}">
-                <a16:creationId xmlns:a16="http://schemas.microsoft.com/office/drawing/2014/main" id="{CB9CBE88-1AEC-4926-A8BE-CD1AB4715BF9}"/>
+                <a16:creationId xmlns:a16="http://schemas.microsoft.com/office/drawing/2014/main" xmlns="" id="{CB9CBE88-1AEC-4926-A8BE-CD1AB4715BF9}"/>
               </a:ext>
             </a:extLst>
           </p:cNvPr>
@@ -37081,7 +37089,7 @@
             </a:lvl9pPr>
           </a:lstStyle>
           <a:p>
-            <a:pPr algn="ctr"/>
+            <a:pPr algn="just"/>
             <a:endParaRPr lang="ko-KR" altLang="en-US" dirty="0"/>
           </a:p>
         </p:txBody>
@@ -37091,7 +37099,7 @@
           <p:cNvPr id="24" name="Donut 39">
             <a:extLst>
               <a:ext uri="{FF2B5EF4-FFF2-40B4-BE49-F238E27FC236}">
-                <a16:creationId xmlns:a16="http://schemas.microsoft.com/office/drawing/2014/main" id="{F30374F1-AAD4-4611-A3E1-12BDC271FD8E}"/>
+                <a16:creationId xmlns:a16="http://schemas.microsoft.com/office/drawing/2014/main" xmlns="" id="{F30374F1-AAD4-4611-A3E1-12BDC271FD8E}"/>
               </a:ext>
             </a:extLst>
           </p:cNvPr>
@@ -37298,7 +37306,7 @@
             </a:lvl9pPr>
           </a:lstStyle>
           <a:p>
-            <a:pPr algn="ctr"/>
+            <a:pPr algn="just"/>
             <a:endParaRPr lang="ko-KR" altLang="en-US" dirty="0">
               <a:solidFill>
                 <a:schemeClr val="tx1"/>
@@ -37307,6 +37315,1190 @@
           </a:p>
         </p:txBody>
       </p:sp>
+      <p:graphicFrame>
+        <p:nvGraphicFramePr>
+          <p:cNvPr id="3" name="Table 2"/>
+          <p:cNvGraphicFramePr>
+            <a:graphicFrameLocks noGrp="1"/>
+          </p:cNvGraphicFramePr>
+          <p:nvPr>
+            <p:extLst>
+              <p:ext uri="{D42A27DB-BD31-4B8C-83A1-F6EECF244321}">
+                <p14:modId xmlns:p14="http://schemas.microsoft.com/office/powerpoint/2010/main" val="3826989377"/>
+              </p:ext>
+            </p:extLst>
+          </p:nvPr>
+        </p:nvGraphicFramePr>
+        <p:xfrm>
+          <a:off x="3797129" y="1264920"/>
+          <a:ext cx="4576403" cy="5279814"/>
+        </p:xfrm>
+        <a:graphic>
+          <a:graphicData uri="http://schemas.openxmlformats.org/drawingml/2006/table">
+            <a:tbl>
+              <a:tblPr firstRow="1" firstCol="1" bandRow="1">
+                <a:tableStyleId>{5C22544A-7EE6-4342-B048-85BDC9FD1C3A}</a:tableStyleId>
+              </a:tblPr>
+              <a:tblGrid>
+                <a:gridCol w="1586169"/>
+                <a:gridCol w="1877633"/>
+                <a:gridCol w="1112601"/>
+              </a:tblGrid>
+              <a:tr h="505954">
+                <a:tc>
+                  <a:txBody>
+                    <a:bodyPr/>
+                    <a:lstStyle/>
+                    <a:p>
+                      <a:pPr algn="ctr">
+                        <a:spcAft>
+                          <a:spcPts val="0"/>
+                        </a:spcAft>
+                      </a:pPr>
+                      <a:r>
+                        <a:rPr lang="en-US" sz="1100" dirty="0">
+                          <a:effectLst/>
+                        </a:rPr>
+                        <a:t>Document Name</a:t>
+                      </a:r>
+                      <a:endParaRPr lang="en-US" sz="1000" dirty="0">
+                        <a:effectLst/>
+                        <a:latin typeface="Times New Roman" panose="02020603050405020304" pitchFamily="18" charset="0"/>
+                        <a:ea typeface="Batang"/>
+                      </a:endParaRPr>
+                    </a:p>
+                  </a:txBody>
+                  <a:tcPr marL="51356" marR="51356" marT="0" marB="0" anchor="ctr"/>
+                </a:tc>
+                <a:tc>
+                  <a:txBody>
+                    <a:bodyPr/>
+                    <a:lstStyle/>
+                    <a:p>
+                      <a:pPr algn="ctr">
+                        <a:spcAft>
+                          <a:spcPts val="0"/>
+                        </a:spcAft>
+                      </a:pPr>
+                      <a:r>
+                        <a:rPr lang="en-US" sz="1100">
+                          <a:effectLst/>
+                        </a:rPr>
+                        <a:t>Member names</a:t>
+                      </a:r>
+                      <a:endParaRPr lang="en-US" sz="1000">
+                        <a:effectLst/>
+                        <a:latin typeface="Times New Roman" panose="02020603050405020304" pitchFamily="18" charset="0"/>
+                        <a:ea typeface="Batang"/>
+                      </a:endParaRPr>
+                    </a:p>
+                  </a:txBody>
+                  <a:tcPr marL="51356" marR="51356" marT="0" marB="0" anchor="ctr"/>
+                </a:tc>
+                <a:tc>
+                  <a:txBody>
+                    <a:bodyPr/>
+                    <a:lstStyle/>
+                    <a:p>
+                      <a:pPr algn="ctr">
+                        <a:spcAft>
+                          <a:spcPts val="0"/>
+                        </a:spcAft>
+                      </a:pPr>
+                      <a:r>
+                        <a:rPr lang="en-US" sz="1100" dirty="0">
+                          <a:effectLst/>
+                        </a:rPr>
+                        <a:t>Status</a:t>
+                      </a:r>
+                      <a:endParaRPr lang="en-US" sz="1000" dirty="0">
+                        <a:effectLst/>
+                        <a:latin typeface="Times New Roman" panose="02020603050405020304" pitchFamily="18" charset="0"/>
+                        <a:ea typeface="Batang"/>
+                      </a:endParaRPr>
+                    </a:p>
+                  </a:txBody>
+                  <a:tcPr marL="51356" marR="51356" marT="0" marB="0" anchor="ctr"/>
+                </a:tc>
+              </a:tr>
+              <a:tr h="438905">
+                <a:tc>
+                  <a:txBody>
+                    <a:bodyPr/>
+                    <a:lstStyle/>
+                    <a:p>
+                      <a:pPr algn="ctr">
+                        <a:lnSpc>
+                          <a:spcPct val="150000"/>
+                        </a:lnSpc>
+                        <a:spcAft>
+                          <a:spcPts val="0"/>
+                        </a:spcAft>
+                      </a:pPr>
+                      <a:r>
+                        <a:rPr lang="en-US" sz="1000">
+                          <a:effectLst/>
+                        </a:rPr>
+                        <a:t>Thiết</a:t>
+                      </a:r>
+                      <a:r>
+                        <a:rPr lang="vi-VN" sz="1000">
+                          <a:effectLst/>
+                        </a:rPr>
+                        <a:t> Kế DataBase</a:t>
+                      </a:r>
+                      <a:endParaRPr lang="en-US" sz="1000">
+                        <a:effectLst/>
+                        <a:latin typeface="Times New Roman" panose="02020603050405020304" pitchFamily="18" charset="0"/>
+                        <a:ea typeface="Batang"/>
+                      </a:endParaRPr>
+                    </a:p>
+                  </a:txBody>
+                  <a:tcPr marL="51356" marR="51356" marT="0" marB="0" anchor="ctr"/>
+                </a:tc>
+                <a:tc>
+                  <a:txBody>
+                    <a:bodyPr/>
+                    <a:lstStyle/>
+                    <a:p>
+                      <a:pPr algn="ctr">
+                        <a:lnSpc>
+                          <a:spcPct val="150000"/>
+                        </a:lnSpc>
+                        <a:spcAft>
+                          <a:spcPts val="0"/>
+                        </a:spcAft>
+                      </a:pPr>
+                      <a:r>
+                        <a:rPr lang="en-US" sz="1000" dirty="0">
+                          <a:effectLst/>
+                        </a:rPr>
+                        <a:t>ThaoNM, NhanNT</a:t>
+                      </a:r>
+                      <a:endParaRPr lang="en-US" sz="1000" dirty="0">
+                        <a:effectLst/>
+                        <a:latin typeface="Times New Roman" panose="02020603050405020304" pitchFamily="18" charset="0"/>
+                        <a:ea typeface="Batang"/>
+                      </a:endParaRPr>
+                    </a:p>
+                  </a:txBody>
+                  <a:tcPr marL="51356" marR="51356" marT="0" marB="0" anchor="ctr"/>
+                </a:tc>
+                <a:tc>
+                  <a:txBody>
+                    <a:bodyPr/>
+                    <a:lstStyle/>
+                    <a:p>
+                      <a:pPr algn="ctr">
+                        <a:lnSpc>
+                          <a:spcPct val="150000"/>
+                        </a:lnSpc>
+                        <a:spcAft>
+                          <a:spcPts val="0"/>
+                        </a:spcAft>
+                      </a:pPr>
+                      <a:r>
+                        <a:rPr lang="en-US" sz="1000" dirty="0">
+                          <a:effectLst/>
+                        </a:rPr>
+                        <a:t>Done</a:t>
+                      </a:r>
+                      <a:endParaRPr lang="en-US" sz="1000" dirty="0">
+                        <a:effectLst/>
+                        <a:latin typeface="Times New Roman" panose="02020603050405020304" pitchFamily="18" charset="0"/>
+                        <a:ea typeface="Batang"/>
+                      </a:endParaRPr>
+                    </a:p>
+                  </a:txBody>
+                  <a:tcPr marL="51356" marR="51356" marT="0" marB="0" anchor="ctr"/>
+                </a:tc>
+              </a:tr>
+              <a:tr h="438905">
+                <a:tc>
+                  <a:txBody>
+                    <a:bodyPr/>
+                    <a:lstStyle/>
+                    <a:p>
+                      <a:pPr algn="ctr">
+                        <a:lnSpc>
+                          <a:spcPct val="150000"/>
+                        </a:lnSpc>
+                        <a:spcAft>
+                          <a:spcPts val="0"/>
+                        </a:spcAft>
+                      </a:pPr>
+                      <a:r>
+                        <a:rPr lang="vi-VN" sz="1000">
+                          <a:effectLst/>
+                        </a:rPr>
+                        <a:t>Viết Doccument</a:t>
+                      </a:r>
+                      <a:endParaRPr lang="en-US" sz="1000">
+                        <a:effectLst/>
+                        <a:latin typeface="Times New Roman" panose="02020603050405020304" pitchFamily="18" charset="0"/>
+                        <a:ea typeface="Batang"/>
+                      </a:endParaRPr>
+                    </a:p>
+                  </a:txBody>
+                  <a:tcPr marL="51356" marR="51356" marT="0" marB="0" anchor="ctr"/>
+                </a:tc>
+                <a:tc>
+                  <a:txBody>
+                    <a:bodyPr/>
+                    <a:lstStyle/>
+                    <a:p>
+                      <a:pPr algn="ctr">
+                        <a:lnSpc>
+                          <a:spcPct val="150000"/>
+                        </a:lnSpc>
+                        <a:spcAft>
+                          <a:spcPts val="0"/>
+                        </a:spcAft>
+                      </a:pPr>
+                      <a:r>
+                        <a:rPr lang="en-US" sz="1000" dirty="0">
+                          <a:effectLst/>
+                        </a:rPr>
+                        <a:t>KhaCV</a:t>
+                      </a:r>
+                      <a:endParaRPr lang="en-US" sz="1000" dirty="0">
+                        <a:effectLst/>
+                        <a:latin typeface="Times New Roman" panose="02020603050405020304" pitchFamily="18" charset="0"/>
+                        <a:ea typeface="Batang"/>
+                      </a:endParaRPr>
+                    </a:p>
+                  </a:txBody>
+                  <a:tcPr marL="51356" marR="51356" marT="0" marB="0" anchor="ctr"/>
+                </a:tc>
+                <a:tc>
+                  <a:txBody>
+                    <a:bodyPr/>
+                    <a:lstStyle/>
+                    <a:p>
+                      <a:pPr algn="ctr">
+                        <a:lnSpc>
+                          <a:spcPct val="150000"/>
+                        </a:lnSpc>
+                        <a:spcAft>
+                          <a:spcPts val="0"/>
+                        </a:spcAft>
+                      </a:pPr>
+                      <a:r>
+                        <a:rPr lang="en-US" sz="1000" dirty="0">
+                          <a:effectLst/>
+                        </a:rPr>
+                        <a:t> </a:t>
+                      </a:r>
+                      <a:endParaRPr lang="en-US" sz="1000" dirty="0">
+                        <a:effectLst/>
+                        <a:latin typeface="Times New Roman" panose="02020603050405020304" pitchFamily="18" charset="0"/>
+                        <a:ea typeface="Batang"/>
+                      </a:endParaRPr>
+                    </a:p>
+                  </a:txBody>
+                  <a:tcPr marL="51356" marR="51356" marT="0" marB="0" anchor="ctr"/>
+                </a:tc>
+              </a:tr>
+              <a:tr h="438905">
+                <a:tc>
+                  <a:txBody>
+                    <a:bodyPr/>
+                    <a:lstStyle/>
+                    <a:p>
+                      <a:pPr algn="ctr">
+                        <a:lnSpc>
+                          <a:spcPct val="150000"/>
+                        </a:lnSpc>
+                        <a:spcAft>
+                          <a:spcPts val="0"/>
+                        </a:spcAft>
+                      </a:pPr>
+                      <a:r>
+                        <a:rPr lang="en-US" sz="1000">
+                          <a:effectLst/>
+                        </a:rPr>
+                        <a:t>Powerpoint</a:t>
+                      </a:r>
+                      <a:endParaRPr lang="en-US" sz="1000">
+                        <a:effectLst/>
+                        <a:latin typeface="Times New Roman" panose="02020603050405020304" pitchFamily="18" charset="0"/>
+                        <a:ea typeface="Batang"/>
+                      </a:endParaRPr>
+                    </a:p>
+                  </a:txBody>
+                  <a:tcPr marL="51356" marR="51356" marT="0" marB="0" anchor="ctr"/>
+                </a:tc>
+                <a:tc>
+                  <a:txBody>
+                    <a:bodyPr/>
+                    <a:lstStyle/>
+                    <a:p>
+                      <a:pPr algn="ctr">
+                        <a:lnSpc>
+                          <a:spcPct val="150000"/>
+                        </a:lnSpc>
+                        <a:spcAft>
+                          <a:spcPts val="0"/>
+                        </a:spcAft>
+                      </a:pPr>
+                      <a:r>
+                        <a:rPr lang="en-US" sz="1000" dirty="0">
+                          <a:effectLst/>
+                        </a:rPr>
+                        <a:t>KhaCV</a:t>
+                      </a:r>
+                      <a:endParaRPr lang="en-US" sz="1000" dirty="0">
+                        <a:effectLst/>
+                        <a:latin typeface="Times New Roman" panose="02020603050405020304" pitchFamily="18" charset="0"/>
+                        <a:ea typeface="Batang"/>
+                      </a:endParaRPr>
+                    </a:p>
+                  </a:txBody>
+                  <a:tcPr marL="51356" marR="51356" marT="0" marB="0" anchor="ctr"/>
+                </a:tc>
+                <a:tc>
+                  <a:txBody>
+                    <a:bodyPr/>
+                    <a:lstStyle/>
+                    <a:p>
+                      <a:pPr algn="ctr">
+                        <a:lnSpc>
+                          <a:spcPct val="150000"/>
+                        </a:lnSpc>
+                        <a:spcAft>
+                          <a:spcPts val="0"/>
+                        </a:spcAft>
+                      </a:pPr>
+                      <a:r>
+                        <a:rPr lang="en-US" sz="1000" dirty="0">
+                          <a:effectLst/>
+                        </a:rPr>
+                        <a:t>Done</a:t>
+                      </a:r>
+                      <a:endParaRPr lang="en-US" sz="1000" dirty="0">
+                        <a:effectLst/>
+                        <a:latin typeface="Times New Roman" panose="02020603050405020304" pitchFamily="18" charset="0"/>
+                        <a:ea typeface="Batang"/>
+                      </a:endParaRPr>
+                    </a:p>
+                  </a:txBody>
+                  <a:tcPr marL="51356" marR="51356" marT="0" marB="0" anchor="ctr"/>
+                </a:tc>
+              </a:tr>
+              <a:tr h="486150">
+                <a:tc>
+                  <a:txBody>
+                    <a:bodyPr/>
+                    <a:lstStyle/>
+                    <a:p>
+                      <a:pPr algn="ctr">
+                        <a:lnSpc>
+                          <a:spcPct val="150000"/>
+                        </a:lnSpc>
+                        <a:spcAft>
+                          <a:spcPts val="0"/>
+                        </a:spcAft>
+                      </a:pPr>
+                      <a:r>
+                        <a:rPr lang="en-US" sz="1000">
+                          <a:effectLst/>
+                        </a:rPr>
+                        <a:t>Load</a:t>
+                      </a:r>
+                      <a:r>
+                        <a:rPr lang="vi-VN" sz="1000">
+                          <a:effectLst/>
+                        </a:rPr>
+                        <a:t> product lên homepage</a:t>
+                      </a:r>
+                      <a:endParaRPr lang="en-US" sz="1000">
+                        <a:effectLst/>
+                        <a:latin typeface="Times New Roman" panose="02020603050405020304" pitchFamily="18" charset="0"/>
+                        <a:ea typeface="Batang"/>
+                      </a:endParaRPr>
+                    </a:p>
+                  </a:txBody>
+                  <a:tcPr marL="51356" marR="51356" marT="0" marB="0" anchor="ctr"/>
+                </a:tc>
+                <a:tc>
+                  <a:txBody>
+                    <a:bodyPr/>
+                    <a:lstStyle/>
+                    <a:p>
+                      <a:pPr algn="ctr">
+                        <a:lnSpc>
+                          <a:spcPct val="150000"/>
+                        </a:lnSpc>
+                        <a:spcAft>
+                          <a:spcPts val="0"/>
+                        </a:spcAft>
+                      </a:pPr>
+                      <a:r>
+                        <a:rPr lang="en-US" sz="1000" dirty="0">
+                          <a:effectLst/>
+                        </a:rPr>
+                        <a:t>NhanNT</a:t>
+                      </a:r>
+                      <a:endParaRPr lang="en-US" sz="1000" dirty="0">
+                        <a:effectLst/>
+                        <a:latin typeface="Times New Roman" panose="02020603050405020304" pitchFamily="18" charset="0"/>
+                        <a:ea typeface="Batang"/>
+                      </a:endParaRPr>
+                    </a:p>
+                  </a:txBody>
+                  <a:tcPr marL="51356" marR="51356" marT="0" marB="0" anchor="ctr"/>
+                </a:tc>
+                <a:tc>
+                  <a:txBody>
+                    <a:bodyPr/>
+                    <a:lstStyle/>
+                    <a:p>
+                      <a:pPr algn="ctr">
+                        <a:lnSpc>
+                          <a:spcPct val="150000"/>
+                        </a:lnSpc>
+                        <a:spcAft>
+                          <a:spcPts val="0"/>
+                        </a:spcAft>
+                      </a:pPr>
+                      <a:r>
+                        <a:rPr lang="en-US" sz="1000">
+                          <a:effectLst/>
+                        </a:rPr>
+                        <a:t>Done</a:t>
+                      </a:r>
+                      <a:endParaRPr lang="en-US" sz="1000">
+                        <a:effectLst/>
+                        <a:latin typeface="Times New Roman" panose="02020603050405020304" pitchFamily="18" charset="0"/>
+                        <a:ea typeface="Batang"/>
+                      </a:endParaRPr>
+                    </a:p>
+                  </a:txBody>
+                  <a:tcPr marL="51356" marR="51356" marT="0" marB="0" anchor="ctr"/>
+                </a:tc>
+              </a:tr>
+              <a:tr h="486150">
+                <a:tc>
+                  <a:txBody>
+                    <a:bodyPr/>
+                    <a:lstStyle/>
+                    <a:p>
+                      <a:pPr algn="ctr">
+                        <a:lnSpc>
+                          <a:spcPct val="150000"/>
+                        </a:lnSpc>
+                        <a:spcAft>
+                          <a:spcPts val="0"/>
+                        </a:spcAft>
+                      </a:pPr>
+                      <a:r>
+                        <a:rPr lang="en-US" sz="1000" dirty="0">
+                          <a:effectLst/>
+                        </a:rPr>
+                        <a:t>Search</a:t>
+                      </a:r>
+                      <a:r>
+                        <a:rPr lang="vi-VN" sz="1000" dirty="0">
+                          <a:effectLst/>
+                        </a:rPr>
+                        <a:t> product by name</a:t>
+                      </a:r>
+                      <a:endParaRPr lang="en-US" sz="1000" dirty="0">
+                        <a:effectLst/>
+                        <a:latin typeface="Times New Roman" panose="02020603050405020304" pitchFamily="18" charset="0"/>
+                        <a:ea typeface="Batang"/>
+                      </a:endParaRPr>
+                    </a:p>
+                  </a:txBody>
+                  <a:tcPr marL="51356" marR="51356" marT="0" marB="0" anchor="ctr"/>
+                </a:tc>
+                <a:tc>
+                  <a:txBody>
+                    <a:bodyPr/>
+                    <a:lstStyle/>
+                    <a:p>
+                      <a:pPr algn="ctr">
+                        <a:lnSpc>
+                          <a:spcPct val="150000"/>
+                        </a:lnSpc>
+                        <a:spcAft>
+                          <a:spcPts val="0"/>
+                        </a:spcAft>
+                      </a:pPr>
+                      <a:r>
+                        <a:rPr lang="en-US" sz="1000" dirty="0">
+                          <a:effectLst/>
+                        </a:rPr>
+                        <a:t>NhanNT</a:t>
+                      </a:r>
+                      <a:endParaRPr lang="en-US" sz="1000" dirty="0">
+                        <a:effectLst/>
+                        <a:latin typeface="Times New Roman" panose="02020603050405020304" pitchFamily="18" charset="0"/>
+                        <a:ea typeface="Batang"/>
+                      </a:endParaRPr>
+                    </a:p>
+                  </a:txBody>
+                  <a:tcPr marL="51356" marR="51356" marT="0" marB="0" anchor="ctr"/>
+                </a:tc>
+                <a:tc>
+                  <a:txBody>
+                    <a:bodyPr/>
+                    <a:lstStyle/>
+                    <a:p>
+                      <a:pPr algn="ctr">
+                        <a:lnSpc>
+                          <a:spcPct val="150000"/>
+                        </a:lnSpc>
+                        <a:spcAft>
+                          <a:spcPts val="0"/>
+                        </a:spcAft>
+                      </a:pPr>
+                      <a:r>
+                        <a:rPr lang="en-US" sz="1000" dirty="0">
+                          <a:effectLst/>
+                        </a:rPr>
+                        <a:t>Done</a:t>
+                      </a:r>
+                      <a:endParaRPr lang="en-US" sz="1000" dirty="0">
+                        <a:effectLst/>
+                        <a:latin typeface="Times New Roman" panose="02020603050405020304" pitchFamily="18" charset="0"/>
+                        <a:ea typeface="Batang"/>
+                      </a:endParaRPr>
+                    </a:p>
+                  </a:txBody>
+                  <a:tcPr marL="51356" marR="51356" marT="0" marB="0" anchor="ctr"/>
+                </a:tc>
+              </a:tr>
+              <a:tr h="243075">
+                <a:tc>
+                  <a:txBody>
+                    <a:bodyPr/>
+                    <a:lstStyle/>
+                    <a:p>
+                      <a:pPr algn="ctr">
+                        <a:lnSpc>
+                          <a:spcPct val="150000"/>
+                        </a:lnSpc>
+                        <a:spcAft>
+                          <a:spcPts val="0"/>
+                        </a:spcAft>
+                      </a:pPr>
+                      <a:r>
+                        <a:rPr lang="en-US" sz="1000">
+                          <a:effectLst/>
+                        </a:rPr>
+                        <a:t>Filter</a:t>
+                      </a:r>
+                      <a:r>
+                        <a:rPr lang="vi-VN" sz="1000">
+                          <a:effectLst/>
+                        </a:rPr>
+                        <a:t> theo  type </a:t>
+                      </a:r>
+                      <a:endParaRPr lang="en-US" sz="1000">
+                        <a:effectLst/>
+                        <a:latin typeface="Times New Roman" panose="02020603050405020304" pitchFamily="18" charset="0"/>
+                        <a:ea typeface="Batang"/>
+                      </a:endParaRPr>
+                    </a:p>
+                  </a:txBody>
+                  <a:tcPr marL="51356" marR="51356" marT="0" marB="0" anchor="ctr"/>
+                </a:tc>
+                <a:tc>
+                  <a:txBody>
+                    <a:bodyPr/>
+                    <a:lstStyle/>
+                    <a:p>
+                      <a:pPr algn="ctr">
+                        <a:lnSpc>
+                          <a:spcPct val="150000"/>
+                        </a:lnSpc>
+                        <a:spcAft>
+                          <a:spcPts val="0"/>
+                        </a:spcAft>
+                      </a:pPr>
+                      <a:r>
+                        <a:rPr lang="en-US" sz="1000" dirty="0">
+                          <a:effectLst/>
+                        </a:rPr>
+                        <a:t>NhanNT</a:t>
+                      </a:r>
+                      <a:endParaRPr lang="en-US" sz="1000" dirty="0">
+                        <a:effectLst/>
+                        <a:latin typeface="Times New Roman" panose="02020603050405020304" pitchFamily="18" charset="0"/>
+                        <a:ea typeface="Batang"/>
+                      </a:endParaRPr>
+                    </a:p>
+                  </a:txBody>
+                  <a:tcPr marL="51356" marR="51356" marT="0" marB="0" anchor="ctr"/>
+                </a:tc>
+                <a:tc>
+                  <a:txBody>
+                    <a:bodyPr/>
+                    <a:lstStyle/>
+                    <a:p>
+                      <a:pPr algn="ctr">
+                        <a:lnSpc>
+                          <a:spcPct val="150000"/>
+                        </a:lnSpc>
+                        <a:spcAft>
+                          <a:spcPts val="0"/>
+                        </a:spcAft>
+                      </a:pPr>
+                      <a:r>
+                        <a:rPr lang="en-US" sz="1000">
+                          <a:effectLst/>
+                        </a:rPr>
+                        <a:t>Done</a:t>
+                      </a:r>
+                      <a:endParaRPr lang="en-US" sz="1000">
+                        <a:effectLst/>
+                        <a:latin typeface="Times New Roman" panose="02020603050405020304" pitchFamily="18" charset="0"/>
+                        <a:ea typeface="Batang"/>
+                      </a:endParaRPr>
+                    </a:p>
+                  </a:txBody>
+                  <a:tcPr marL="51356" marR="51356" marT="0" marB="0" anchor="ctr"/>
+                </a:tc>
+              </a:tr>
+              <a:tr h="438905">
+                <a:tc>
+                  <a:txBody>
+                    <a:bodyPr/>
+                    <a:lstStyle/>
+                    <a:p>
+                      <a:pPr algn="ctr">
+                        <a:lnSpc>
+                          <a:spcPct val="150000"/>
+                        </a:lnSpc>
+                        <a:spcAft>
+                          <a:spcPts val="0"/>
+                        </a:spcAft>
+                      </a:pPr>
+                      <a:r>
+                        <a:rPr lang="en-US" sz="1000">
+                          <a:effectLst/>
+                        </a:rPr>
+                        <a:t>Login</a:t>
+                      </a:r>
+                      <a:r>
+                        <a:rPr lang="vi-VN" sz="1000">
+                          <a:effectLst/>
+                        </a:rPr>
+                        <a:t> bằng Google</a:t>
+                      </a:r>
+                      <a:endParaRPr lang="en-US" sz="1000">
+                        <a:effectLst/>
+                        <a:latin typeface="Times New Roman" panose="02020603050405020304" pitchFamily="18" charset="0"/>
+                        <a:ea typeface="Batang"/>
+                      </a:endParaRPr>
+                    </a:p>
+                  </a:txBody>
+                  <a:tcPr marL="51356" marR="51356" marT="0" marB="0" anchor="ctr"/>
+                </a:tc>
+                <a:tc>
+                  <a:txBody>
+                    <a:bodyPr/>
+                    <a:lstStyle/>
+                    <a:p>
+                      <a:pPr algn="ctr">
+                        <a:lnSpc>
+                          <a:spcPct val="150000"/>
+                        </a:lnSpc>
+                        <a:spcAft>
+                          <a:spcPts val="0"/>
+                        </a:spcAft>
+                      </a:pPr>
+                      <a:r>
+                        <a:rPr lang="en-US" sz="1000" dirty="0">
+                          <a:effectLst/>
+                        </a:rPr>
+                        <a:t>KhaCV</a:t>
+                      </a:r>
+                      <a:endParaRPr lang="en-US" sz="1000" dirty="0">
+                        <a:effectLst/>
+                        <a:latin typeface="Times New Roman" panose="02020603050405020304" pitchFamily="18" charset="0"/>
+                        <a:ea typeface="Batang"/>
+                      </a:endParaRPr>
+                    </a:p>
+                  </a:txBody>
+                  <a:tcPr marL="51356" marR="51356" marT="0" marB="0" anchor="ctr"/>
+                </a:tc>
+                <a:tc>
+                  <a:txBody>
+                    <a:bodyPr/>
+                    <a:lstStyle/>
+                    <a:p>
+                      <a:pPr algn="ctr">
+                        <a:lnSpc>
+                          <a:spcPct val="150000"/>
+                        </a:lnSpc>
+                        <a:spcAft>
+                          <a:spcPts val="0"/>
+                        </a:spcAft>
+                      </a:pPr>
+                      <a:r>
+                        <a:rPr lang="en-US" sz="1000">
+                          <a:effectLst/>
+                        </a:rPr>
+                        <a:t>Done</a:t>
+                      </a:r>
+                      <a:endParaRPr lang="en-US" sz="1000">
+                        <a:effectLst/>
+                        <a:latin typeface="Times New Roman" panose="02020603050405020304" pitchFamily="18" charset="0"/>
+                        <a:ea typeface="Batang"/>
+                      </a:endParaRPr>
+                    </a:p>
+                  </a:txBody>
+                  <a:tcPr marL="51356" marR="51356" marT="0" marB="0" anchor="ctr"/>
+                </a:tc>
+              </a:tr>
+              <a:tr h="438905">
+                <a:tc>
+                  <a:txBody>
+                    <a:bodyPr/>
+                    <a:lstStyle/>
+                    <a:p>
+                      <a:pPr algn="ctr">
+                        <a:lnSpc>
+                          <a:spcPct val="150000"/>
+                        </a:lnSpc>
+                        <a:spcAft>
+                          <a:spcPts val="0"/>
+                        </a:spcAft>
+                      </a:pPr>
+                      <a:r>
+                        <a:rPr lang="vi-VN" sz="1000">
+                          <a:effectLst/>
+                        </a:rPr>
+                        <a:t>Gắn map</a:t>
+                      </a:r>
+                      <a:endParaRPr lang="en-US" sz="1000">
+                        <a:effectLst/>
+                        <a:latin typeface="Times New Roman" panose="02020603050405020304" pitchFamily="18" charset="0"/>
+                        <a:ea typeface="Batang"/>
+                      </a:endParaRPr>
+                    </a:p>
+                  </a:txBody>
+                  <a:tcPr marL="51356" marR="51356" marT="0" marB="0" anchor="ctr"/>
+                </a:tc>
+                <a:tc>
+                  <a:txBody>
+                    <a:bodyPr/>
+                    <a:lstStyle/>
+                    <a:p>
+                      <a:pPr algn="ctr">
+                        <a:lnSpc>
+                          <a:spcPct val="150000"/>
+                        </a:lnSpc>
+                        <a:spcAft>
+                          <a:spcPts val="0"/>
+                        </a:spcAft>
+                      </a:pPr>
+                      <a:r>
+                        <a:rPr lang="en-US" sz="1000" dirty="0">
+                          <a:effectLst/>
+                        </a:rPr>
+                        <a:t>NhanDT</a:t>
+                      </a:r>
+                      <a:endParaRPr lang="en-US" sz="1000" dirty="0">
+                        <a:effectLst/>
+                        <a:latin typeface="Times New Roman" panose="02020603050405020304" pitchFamily="18" charset="0"/>
+                        <a:ea typeface="Batang"/>
+                      </a:endParaRPr>
+                    </a:p>
+                  </a:txBody>
+                  <a:tcPr marL="51356" marR="51356" marT="0" marB="0" anchor="ctr"/>
+                </a:tc>
+                <a:tc>
+                  <a:txBody>
+                    <a:bodyPr/>
+                    <a:lstStyle/>
+                    <a:p>
+                      <a:pPr algn="ctr">
+                        <a:lnSpc>
+                          <a:spcPct val="150000"/>
+                        </a:lnSpc>
+                        <a:spcAft>
+                          <a:spcPts val="0"/>
+                        </a:spcAft>
+                      </a:pPr>
+                      <a:r>
+                        <a:rPr lang="en-US" sz="1000">
+                          <a:effectLst/>
+                        </a:rPr>
+                        <a:t>Not Yet</a:t>
+                      </a:r>
+                      <a:endParaRPr lang="en-US" sz="1000">
+                        <a:effectLst/>
+                        <a:latin typeface="Times New Roman" panose="02020603050405020304" pitchFamily="18" charset="0"/>
+                        <a:ea typeface="Batang"/>
+                      </a:endParaRPr>
+                    </a:p>
+                  </a:txBody>
+                  <a:tcPr marL="51356" marR="51356" marT="0" marB="0" anchor="ctr"/>
+                </a:tc>
+              </a:tr>
+              <a:tr h="438905">
+                <a:tc>
+                  <a:txBody>
+                    <a:bodyPr/>
+                    <a:lstStyle/>
+                    <a:p>
+                      <a:pPr algn="ctr">
+                        <a:lnSpc>
+                          <a:spcPct val="150000"/>
+                        </a:lnSpc>
+                        <a:spcAft>
+                          <a:spcPts val="0"/>
+                        </a:spcAft>
+                      </a:pPr>
+                      <a:r>
+                        <a:rPr lang="vi-VN" sz="1000">
+                          <a:effectLst/>
+                        </a:rPr>
+                        <a:t>Detail product</a:t>
+                      </a:r>
+                      <a:endParaRPr lang="en-US" sz="1000">
+                        <a:effectLst/>
+                        <a:latin typeface="Times New Roman" panose="02020603050405020304" pitchFamily="18" charset="0"/>
+                        <a:ea typeface="Batang"/>
+                      </a:endParaRPr>
+                    </a:p>
+                  </a:txBody>
+                  <a:tcPr marL="51356" marR="51356" marT="0" marB="0" anchor="ctr"/>
+                </a:tc>
+                <a:tc>
+                  <a:txBody>
+                    <a:bodyPr/>
+                    <a:lstStyle/>
+                    <a:p>
+                      <a:pPr algn="ctr">
+                        <a:lnSpc>
+                          <a:spcPct val="150000"/>
+                        </a:lnSpc>
+                        <a:spcAft>
+                          <a:spcPts val="0"/>
+                        </a:spcAft>
+                      </a:pPr>
+                      <a:r>
+                        <a:rPr lang="en-US" sz="1000" dirty="0">
+                          <a:effectLst/>
+                        </a:rPr>
+                        <a:t>NhanNT</a:t>
+                      </a:r>
+                      <a:endParaRPr lang="en-US" sz="1000" dirty="0">
+                        <a:effectLst/>
+                        <a:latin typeface="Times New Roman" panose="02020603050405020304" pitchFamily="18" charset="0"/>
+                        <a:ea typeface="Batang"/>
+                      </a:endParaRPr>
+                    </a:p>
+                  </a:txBody>
+                  <a:tcPr marL="51356" marR="51356" marT="0" marB="0" anchor="ctr"/>
+                </a:tc>
+                <a:tc>
+                  <a:txBody>
+                    <a:bodyPr/>
+                    <a:lstStyle/>
+                    <a:p>
+                      <a:pPr algn="ctr">
+                        <a:lnSpc>
+                          <a:spcPct val="150000"/>
+                        </a:lnSpc>
+                        <a:spcAft>
+                          <a:spcPts val="0"/>
+                        </a:spcAft>
+                      </a:pPr>
+                      <a:r>
+                        <a:rPr lang="en-US" sz="1000">
+                          <a:effectLst/>
+                        </a:rPr>
+                        <a:t>Done</a:t>
+                      </a:r>
+                      <a:endParaRPr lang="en-US" sz="1000">
+                        <a:effectLst/>
+                        <a:latin typeface="Times New Roman" panose="02020603050405020304" pitchFamily="18" charset="0"/>
+                        <a:ea typeface="Batang"/>
+                      </a:endParaRPr>
+                    </a:p>
+                  </a:txBody>
+                  <a:tcPr marL="51356" marR="51356" marT="0" marB="0" anchor="ctr"/>
+                </a:tc>
+              </a:tr>
+              <a:tr h="243075">
+                <a:tc>
+                  <a:txBody>
+                    <a:bodyPr/>
+                    <a:lstStyle/>
+                    <a:p>
+                      <a:pPr algn="ctr">
+                        <a:lnSpc>
+                          <a:spcPct val="150000"/>
+                        </a:lnSpc>
+                        <a:spcAft>
+                          <a:spcPts val="0"/>
+                        </a:spcAft>
+                      </a:pPr>
+                      <a:r>
+                        <a:rPr lang="vi-VN" sz="1000">
+                          <a:effectLst/>
+                        </a:rPr>
+                        <a:t>Edit thông tin user</a:t>
+                      </a:r>
+                      <a:endParaRPr lang="en-US" sz="1000">
+                        <a:effectLst/>
+                        <a:latin typeface="Times New Roman" panose="02020603050405020304" pitchFamily="18" charset="0"/>
+                        <a:ea typeface="Batang"/>
+                      </a:endParaRPr>
+                    </a:p>
+                  </a:txBody>
+                  <a:tcPr marL="51356" marR="51356" marT="0" marB="0" anchor="ctr"/>
+                </a:tc>
+                <a:tc>
+                  <a:txBody>
+                    <a:bodyPr/>
+                    <a:lstStyle/>
+                    <a:p>
+                      <a:pPr algn="ctr">
+                        <a:lnSpc>
+                          <a:spcPct val="150000"/>
+                        </a:lnSpc>
+                        <a:spcAft>
+                          <a:spcPts val="0"/>
+                        </a:spcAft>
+                      </a:pPr>
+                      <a:r>
+                        <a:rPr lang="en-US" sz="1000" dirty="0">
+                          <a:effectLst/>
+                        </a:rPr>
+                        <a:t>LinhNC</a:t>
+                      </a:r>
+                      <a:endParaRPr lang="en-US" sz="1000" dirty="0">
+                        <a:effectLst/>
+                        <a:latin typeface="Times New Roman" panose="02020603050405020304" pitchFamily="18" charset="0"/>
+                        <a:ea typeface="Batang"/>
+                      </a:endParaRPr>
+                    </a:p>
+                  </a:txBody>
+                  <a:tcPr marL="51356" marR="51356" marT="0" marB="0" anchor="ctr"/>
+                </a:tc>
+                <a:tc>
+                  <a:txBody>
+                    <a:bodyPr/>
+                    <a:lstStyle/>
+                    <a:p>
+                      <a:pPr algn="ctr">
+                        <a:lnSpc>
+                          <a:spcPct val="150000"/>
+                        </a:lnSpc>
+                        <a:spcAft>
+                          <a:spcPts val="0"/>
+                        </a:spcAft>
+                      </a:pPr>
+                      <a:r>
+                        <a:rPr lang="en-US" sz="1000">
+                          <a:effectLst/>
+                        </a:rPr>
+                        <a:t>Not Yet</a:t>
+                      </a:r>
+                      <a:endParaRPr lang="en-US" sz="1000">
+                        <a:effectLst/>
+                        <a:latin typeface="Times New Roman" panose="02020603050405020304" pitchFamily="18" charset="0"/>
+                        <a:ea typeface="Batang"/>
+                      </a:endParaRPr>
+                    </a:p>
+                  </a:txBody>
+                  <a:tcPr marL="51356" marR="51356" marT="0" marB="0" anchor="ctr"/>
+                </a:tc>
+              </a:tr>
+              <a:tr h="438905">
+                <a:tc>
+                  <a:txBody>
+                    <a:bodyPr/>
+                    <a:lstStyle/>
+                    <a:p>
+                      <a:pPr algn="ctr">
+                        <a:lnSpc>
+                          <a:spcPct val="150000"/>
+                        </a:lnSpc>
+                        <a:spcAft>
+                          <a:spcPts val="0"/>
+                        </a:spcAft>
+                      </a:pPr>
+                      <a:r>
+                        <a:rPr lang="en-US" sz="1000">
+                          <a:effectLst/>
+                        </a:rPr>
+                        <a:t>History Order</a:t>
+                      </a:r>
+                      <a:endParaRPr lang="en-US" sz="1000">
+                        <a:effectLst/>
+                        <a:latin typeface="Times New Roman" panose="02020603050405020304" pitchFamily="18" charset="0"/>
+                        <a:ea typeface="Batang"/>
+                      </a:endParaRPr>
+                    </a:p>
+                  </a:txBody>
+                  <a:tcPr marL="51356" marR="51356" marT="0" marB="0" anchor="ctr"/>
+                </a:tc>
+                <a:tc>
+                  <a:txBody>
+                    <a:bodyPr/>
+                    <a:lstStyle/>
+                    <a:p>
+                      <a:pPr algn="ctr">
+                        <a:lnSpc>
+                          <a:spcPct val="150000"/>
+                        </a:lnSpc>
+                        <a:spcAft>
+                          <a:spcPts val="0"/>
+                        </a:spcAft>
+                      </a:pPr>
+                      <a:r>
+                        <a:rPr lang="en-US" sz="1000" dirty="0">
+                          <a:effectLst/>
+                        </a:rPr>
+                        <a:t>ThaoNM</a:t>
+                      </a:r>
+                      <a:endParaRPr lang="en-US" sz="1000" dirty="0">
+                        <a:effectLst/>
+                        <a:latin typeface="Times New Roman" panose="02020603050405020304" pitchFamily="18" charset="0"/>
+                        <a:ea typeface="Batang"/>
+                      </a:endParaRPr>
+                    </a:p>
+                  </a:txBody>
+                  <a:tcPr marL="51356" marR="51356" marT="0" marB="0" anchor="ctr"/>
+                </a:tc>
+                <a:tc>
+                  <a:txBody>
+                    <a:bodyPr/>
+                    <a:lstStyle/>
+                    <a:p>
+                      <a:pPr algn="ctr">
+                        <a:lnSpc>
+                          <a:spcPct val="150000"/>
+                        </a:lnSpc>
+                        <a:spcAft>
+                          <a:spcPts val="0"/>
+                        </a:spcAft>
+                      </a:pPr>
+                      <a:r>
+                        <a:rPr lang="en-US" sz="1000">
+                          <a:effectLst/>
+                        </a:rPr>
+                        <a:t>Done</a:t>
+                      </a:r>
+                      <a:endParaRPr lang="en-US" sz="1000">
+                        <a:effectLst/>
+                        <a:latin typeface="Times New Roman" panose="02020603050405020304" pitchFamily="18" charset="0"/>
+                        <a:ea typeface="Batang"/>
+                      </a:endParaRPr>
+                    </a:p>
+                  </a:txBody>
+                  <a:tcPr marL="51356" marR="51356" marT="0" marB="0" anchor="ctr"/>
+                </a:tc>
+              </a:tr>
+              <a:tr h="243075">
+                <a:tc>
+                  <a:txBody>
+                    <a:bodyPr/>
+                    <a:lstStyle/>
+                    <a:p>
+                      <a:pPr algn="ctr">
+                        <a:lnSpc>
+                          <a:spcPct val="150000"/>
+                        </a:lnSpc>
+                        <a:spcAft>
+                          <a:spcPts val="0"/>
+                        </a:spcAft>
+                      </a:pPr>
+                      <a:r>
+                        <a:rPr lang="vi-VN" sz="1000">
+                          <a:effectLst/>
+                        </a:rPr>
+                        <a:t>Order(</a:t>
+                      </a:r>
+                      <a:r>
+                        <a:rPr lang="en-US" sz="1000">
+                          <a:effectLst/>
+                        </a:rPr>
+                        <a:t>Food</a:t>
+                      </a:r>
+                      <a:r>
+                        <a:rPr lang="vi-VN" sz="1000">
+                          <a:effectLst/>
+                        </a:rPr>
+                        <a:t>)</a:t>
+                      </a:r>
+                      <a:endParaRPr lang="en-US" sz="1000">
+                        <a:effectLst/>
+                        <a:latin typeface="Times New Roman" panose="02020603050405020304" pitchFamily="18" charset="0"/>
+                        <a:ea typeface="Batang"/>
+                      </a:endParaRPr>
+                    </a:p>
+                  </a:txBody>
+                  <a:tcPr marL="51356" marR="51356" marT="0" marB="0" anchor="ctr"/>
+                </a:tc>
+                <a:tc>
+                  <a:txBody>
+                    <a:bodyPr/>
+                    <a:lstStyle/>
+                    <a:p>
+                      <a:pPr algn="ctr">
+                        <a:lnSpc>
+                          <a:spcPct val="150000"/>
+                        </a:lnSpc>
+                        <a:spcAft>
+                          <a:spcPts val="0"/>
+                        </a:spcAft>
+                      </a:pPr>
+                      <a:r>
+                        <a:rPr lang="en-US" sz="1000" dirty="0">
+                          <a:effectLst/>
+                        </a:rPr>
+                        <a:t>NhanNT, ThaoNM</a:t>
+                      </a:r>
+                      <a:endParaRPr lang="en-US" sz="1000" dirty="0">
+                        <a:effectLst/>
+                        <a:latin typeface="Times New Roman" panose="02020603050405020304" pitchFamily="18" charset="0"/>
+                        <a:ea typeface="Batang"/>
+                      </a:endParaRPr>
+                    </a:p>
+                  </a:txBody>
+                  <a:tcPr marL="51356" marR="51356" marT="0" marB="0" anchor="ctr"/>
+                </a:tc>
+                <a:tc>
+                  <a:txBody>
+                    <a:bodyPr/>
+                    <a:lstStyle/>
+                    <a:p>
+                      <a:pPr algn="ctr">
+                        <a:lnSpc>
+                          <a:spcPct val="150000"/>
+                        </a:lnSpc>
+                        <a:spcAft>
+                          <a:spcPts val="0"/>
+                        </a:spcAft>
+                      </a:pPr>
+                      <a:r>
+                        <a:rPr lang="en-US" sz="1000" dirty="0">
+                          <a:effectLst/>
+                        </a:rPr>
+                        <a:t>Done</a:t>
+                      </a:r>
+                      <a:endParaRPr lang="en-US" sz="1000" dirty="0">
+                        <a:effectLst/>
+                        <a:latin typeface="Times New Roman" panose="02020603050405020304" pitchFamily="18" charset="0"/>
+                        <a:ea typeface="Batang"/>
+                      </a:endParaRPr>
+                    </a:p>
+                  </a:txBody>
+                  <a:tcPr marL="51356" marR="51356" marT="0" marB="0" anchor="ctr"/>
+                </a:tc>
+              </a:tr>
+            </a:tbl>
+          </a:graphicData>
+        </a:graphic>
+      </p:graphicFrame>
     </p:spTree>
     <p:extLst>
       <p:ext uri="{BB962C8B-B14F-4D97-AF65-F5344CB8AC3E}">
@@ -37317,6 +38509,13 @@
   <p:clrMapOvr>
     <a:masterClrMapping/>
   </p:clrMapOvr>
+  <p:timing>
+    <p:tnLst>
+      <p:par>
+        <p:cTn id="1" dur="indefinite" restart="never" nodeType="tmRoot"/>
+      </p:par>
+    </p:tnLst>
+  </p:timing>
 </p:sld>
 </file>
 
@@ -37342,7 +38541,7 @@
           <p:cNvPr id="2" name="Text Placeholder 1">
             <a:extLst>
               <a:ext uri="{FF2B5EF4-FFF2-40B4-BE49-F238E27FC236}">
-                <a16:creationId xmlns:a16="http://schemas.microsoft.com/office/drawing/2014/main" id="{CE39EC58-F67D-468A-A3B6-01A6229ACBBD}"/>
+                <a16:creationId xmlns:a16="http://schemas.microsoft.com/office/drawing/2014/main" xmlns="" id="{CE39EC58-F67D-468A-A3B6-01A6229ACBBD}"/>
               </a:ext>
             </a:extLst>
           </p:cNvPr>
@@ -37382,7 +38581,7 @@
           <p:cNvPr id="5" name="Picture 4">
             <a:extLst>
               <a:ext uri="{FF2B5EF4-FFF2-40B4-BE49-F238E27FC236}">
-                <a16:creationId xmlns:a16="http://schemas.microsoft.com/office/drawing/2014/main" id="{EC2AD3D7-500C-41DC-BA87-56E775194AE3}"/>
+                <a16:creationId xmlns:a16="http://schemas.microsoft.com/office/drawing/2014/main" xmlns="" id="{EC2AD3D7-500C-41DC-BA87-56E775194AE3}"/>
               </a:ext>
             </a:extLst>
           </p:cNvPr>
@@ -37392,7 +38591,7 @@
           <p:nvPr/>
         </p:nvPicPr>
         <p:blipFill>
-          <a:blip r:embed="rId2">
+          <a:blip r:embed="rId2" cstate="print">
             <a:extLst>
               <a:ext uri="{28A0092B-C50C-407E-A947-70E740481C1C}">
                 <a14:useLocalDpi xmlns:a14="http://schemas.microsoft.com/office/drawing/2010/main" val="0"/>
@@ -37423,6 +38622,13 @@
   <p:clrMapOvr>
     <a:masterClrMapping/>
   </p:clrMapOvr>
+  <p:timing>
+    <p:tnLst>
+      <p:par>
+        <p:cTn id="1" dur="indefinite" restart="never" nodeType="tmRoot"/>
+      </p:par>
+    </p:tnLst>
+  </p:timing>
 </p:sld>
 </file>
 
@@ -37448,7 +38654,7 @@
           <p:cNvPr id="6" name="Group 5">
             <a:extLst>
               <a:ext uri="{FF2B5EF4-FFF2-40B4-BE49-F238E27FC236}">
-                <a16:creationId xmlns:a16="http://schemas.microsoft.com/office/drawing/2014/main" id="{0CF04C35-111F-439B-9CFF-A04A35AD3FA9}"/>
+                <a16:creationId xmlns:a16="http://schemas.microsoft.com/office/drawing/2014/main" xmlns="" id="{0CF04C35-111F-439B-9CFF-A04A35AD3FA9}"/>
               </a:ext>
             </a:extLst>
           </p:cNvPr>
@@ -37468,7 +38674,7 @@
             <p:cNvPr id="2" name="TextBox 1">
               <a:extLst>
                 <a:ext uri="{FF2B5EF4-FFF2-40B4-BE49-F238E27FC236}">
-                  <a16:creationId xmlns:a16="http://schemas.microsoft.com/office/drawing/2014/main" id="{29E2714A-BE29-4E83-A155-D5802C472B0A}"/>
+                  <a16:creationId xmlns:a16="http://schemas.microsoft.com/office/drawing/2014/main" xmlns="" id="{29E2714A-BE29-4E83-A155-D5802C472B0A}"/>
                 </a:ext>
               </a:extLst>
             </p:cNvPr>
@@ -37521,7 +38727,7 @@
             <p:cNvPr id="3" name="TextBox 2">
               <a:extLst>
                 <a:ext uri="{FF2B5EF4-FFF2-40B4-BE49-F238E27FC236}">
-                  <a16:creationId xmlns:a16="http://schemas.microsoft.com/office/drawing/2014/main" id="{279A9243-91CB-437D-9D82-6D402B13F59A}"/>
+                  <a16:creationId xmlns:a16="http://schemas.microsoft.com/office/drawing/2014/main" xmlns="" id="{279A9243-91CB-437D-9D82-6D402B13F59A}"/>
                 </a:ext>
               </a:extLst>
             </p:cNvPr>
@@ -37580,6 +38786,13 @@
   <p:clrMapOvr>
     <a:masterClrMapping/>
   </p:clrMapOvr>
+  <p:timing>
+    <p:tnLst>
+      <p:par>
+        <p:cTn id="1" dur="indefinite" restart="never" nodeType="tmRoot"/>
+      </p:par>
+    </p:tnLst>
+  </p:timing>
 </p:sld>
 </file>
 

</xml_diff>